<commit_message>
Went through all pictures except for last one
</commit_message>
<xml_diff>
--- a/Picture1ab.pptx
+++ b/Picture1ab.pptx
@@ -244,7 +244,7 @@
           <a:p>
             <a:fld id="{D61CA99B-1A52-41E4-BE43-6641B2C1149F}" type="datetimeFigureOut">
               <a:rPr lang="en-US" smtClean="0"/>
-              <a:t>2/10/2015</a:t>
+              <a:t>5/7/2015</a:t>
             </a:fld>
             <a:endParaRPr lang="en-US"/>
           </a:p>
@@ -414,7 +414,7 @@
           <a:p>
             <a:fld id="{D61CA99B-1A52-41E4-BE43-6641B2C1149F}" type="datetimeFigureOut">
               <a:rPr lang="en-US" smtClean="0"/>
-              <a:t>2/10/2015</a:t>
+              <a:t>5/7/2015</a:t>
             </a:fld>
             <a:endParaRPr lang="en-US"/>
           </a:p>
@@ -594,7 +594,7 @@
           <a:p>
             <a:fld id="{D61CA99B-1A52-41E4-BE43-6641B2C1149F}" type="datetimeFigureOut">
               <a:rPr lang="en-US" smtClean="0"/>
-              <a:t>2/10/2015</a:t>
+              <a:t>5/7/2015</a:t>
             </a:fld>
             <a:endParaRPr lang="en-US"/>
           </a:p>
@@ -764,7 +764,7 @@
           <a:p>
             <a:fld id="{D61CA99B-1A52-41E4-BE43-6641B2C1149F}" type="datetimeFigureOut">
               <a:rPr lang="en-US" smtClean="0"/>
-              <a:t>2/10/2015</a:t>
+              <a:t>5/7/2015</a:t>
             </a:fld>
             <a:endParaRPr lang="en-US"/>
           </a:p>
@@ -1010,7 +1010,7 @@
           <a:p>
             <a:fld id="{D61CA99B-1A52-41E4-BE43-6641B2C1149F}" type="datetimeFigureOut">
               <a:rPr lang="en-US" smtClean="0"/>
-              <a:t>2/10/2015</a:t>
+              <a:t>5/7/2015</a:t>
             </a:fld>
             <a:endParaRPr lang="en-US"/>
           </a:p>
@@ -1242,7 +1242,7 @@
           <a:p>
             <a:fld id="{D61CA99B-1A52-41E4-BE43-6641B2C1149F}" type="datetimeFigureOut">
               <a:rPr lang="en-US" smtClean="0"/>
-              <a:t>2/10/2015</a:t>
+              <a:t>5/7/2015</a:t>
             </a:fld>
             <a:endParaRPr lang="en-US"/>
           </a:p>
@@ -1609,7 +1609,7 @@
           <a:p>
             <a:fld id="{D61CA99B-1A52-41E4-BE43-6641B2C1149F}" type="datetimeFigureOut">
               <a:rPr lang="en-US" smtClean="0"/>
-              <a:t>2/10/2015</a:t>
+              <a:t>5/7/2015</a:t>
             </a:fld>
             <a:endParaRPr lang="en-US"/>
           </a:p>
@@ -1727,7 +1727,7 @@
           <a:p>
             <a:fld id="{D61CA99B-1A52-41E4-BE43-6641B2C1149F}" type="datetimeFigureOut">
               <a:rPr lang="en-US" smtClean="0"/>
-              <a:t>2/10/2015</a:t>
+              <a:t>5/7/2015</a:t>
             </a:fld>
             <a:endParaRPr lang="en-US"/>
           </a:p>
@@ -1822,7 +1822,7 @@
           <a:p>
             <a:fld id="{D61CA99B-1A52-41E4-BE43-6641B2C1149F}" type="datetimeFigureOut">
               <a:rPr lang="en-US" smtClean="0"/>
-              <a:t>2/10/2015</a:t>
+              <a:t>5/7/2015</a:t>
             </a:fld>
             <a:endParaRPr lang="en-US"/>
           </a:p>
@@ -2099,7 +2099,7 @@
           <a:p>
             <a:fld id="{D61CA99B-1A52-41E4-BE43-6641B2C1149F}" type="datetimeFigureOut">
               <a:rPr lang="en-US" smtClean="0"/>
-              <a:t>2/10/2015</a:t>
+              <a:t>5/7/2015</a:t>
             </a:fld>
             <a:endParaRPr lang="en-US"/>
           </a:p>
@@ -2352,7 +2352,7 @@
           <a:p>
             <a:fld id="{D61CA99B-1A52-41E4-BE43-6641B2C1149F}" type="datetimeFigureOut">
               <a:rPr lang="en-US" smtClean="0"/>
-              <a:t>2/10/2015</a:t>
+              <a:t>5/7/2015</a:t>
             </a:fld>
             <a:endParaRPr lang="en-US"/>
           </a:p>
@@ -2565,7 +2565,7 @@
           <a:p>
             <a:fld id="{D61CA99B-1A52-41E4-BE43-6641B2C1149F}" type="datetimeFigureOut">
               <a:rPr lang="en-US" smtClean="0"/>
-              <a:t>2/10/2015</a:t>
+              <a:t>5/7/2015</a:t>
             </a:fld>
             <a:endParaRPr lang="en-US"/>
           </a:p>
@@ -3389,8 +3389,8 @@
           </a:p>
         </p:txBody>
       </p:sp>
-      <mc:AlternateContent xmlns:mc="http://schemas.openxmlformats.org/markup-compatibility/2006">
-        <mc:Choice xmlns:a14="http://schemas.microsoft.com/office/drawing/2010/main" Requires="a14">
+      <mc:AlternateContent xmlns:mc="http://schemas.openxmlformats.org/markup-compatibility/2006" xmlns:a14="http://schemas.microsoft.com/office/drawing/2010/main">
+        <mc:Choice Requires="a14">
           <p:sp>
             <p:nvSpPr>
               <p:cNvPr id="20" name="TextBox 19"/>
@@ -3479,7 +3479,7 @@
             </p:txBody>
           </p:sp>
         </mc:Choice>
-        <mc:Fallback>
+        <mc:Fallback xmlns="">
           <p:sp>
             <p:nvSpPr>
               <p:cNvPr id="20" name="TextBox 19"/>
@@ -3518,8 +3518,8 @@
           </p:sp>
         </mc:Fallback>
       </mc:AlternateContent>
-      <mc:AlternateContent xmlns:mc="http://schemas.openxmlformats.org/markup-compatibility/2006">
-        <mc:Choice xmlns:a14="http://schemas.microsoft.com/office/drawing/2010/main" Requires="a14">
+      <mc:AlternateContent xmlns:mc="http://schemas.openxmlformats.org/markup-compatibility/2006" xmlns:a14="http://schemas.microsoft.com/office/drawing/2010/main">
+        <mc:Choice Requires="a14">
           <p:sp>
             <p:nvSpPr>
               <p:cNvPr id="21" name="TextBox 20"/>
@@ -3608,7 +3608,7 @@
             </p:txBody>
           </p:sp>
         </mc:Choice>
-        <mc:Fallback>
+        <mc:Fallback xmlns="">
           <p:sp>
             <p:nvSpPr>
               <p:cNvPr id="21" name="TextBox 20"/>
@@ -4454,8 +4454,8 @@
           </a:p>
         </p:txBody>
       </p:sp>
-      <mc:AlternateContent xmlns:mc="http://schemas.openxmlformats.org/markup-compatibility/2006">
-        <mc:Choice xmlns:a14="http://schemas.microsoft.com/office/drawing/2010/main" Requires="a14">
+      <mc:AlternateContent xmlns:mc="http://schemas.openxmlformats.org/markup-compatibility/2006" xmlns:a14="http://schemas.microsoft.com/office/drawing/2010/main">
+        <mc:Choice Requires="a14">
           <p:sp>
             <p:nvSpPr>
               <p:cNvPr id="69" name="TextBox 68"/>
@@ -4478,6 +4478,7 @@
               </a:bodyPr>
               <a:lstStyle/>
               <a:p>
+                <a:pPr/>
                 <a14:m>
                   <m:oMathPara xmlns:m="http://schemas.openxmlformats.org/officeDocument/2006/math">
                     <m:oMathParaPr>
@@ -4515,7 +4516,7 @@
             </p:txBody>
           </p:sp>
         </mc:Choice>
-        <mc:Fallback>
+        <mc:Fallback xmlns="">
           <p:sp>
             <p:nvSpPr>
               <p:cNvPr id="69" name="TextBox 68"/>
@@ -4554,8 +4555,8 @@
           </p:sp>
         </mc:Fallback>
       </mc:AlternateContent>
-      <mc:AlternateContent xmlns:mc="http://schemas.openxmlformats.org/markup-compatibility/2006">
-        <mc:Choice xmlns:a14="http://schemas.microsoft.com/office/drawing/2010/main" Requires="a14">
+      <mc:AlternateContent xmlns:mc="http://schemas.openxmlformats.org/markup-compatibility/2006" xmlns:a14="http://schemas.microsoft.com/office/drawing/2010/main">
+        <mc:Choice Requires="a14">
           <p:sp>
             <p:nvSpPr>
               <p:cNvPr id="70" name="TextBox 69"/>
@@ -4578,6 +4579,7 @@
               </a:bodyPr>
               <a:lstStyle/>
               <a:p>
+                <a:pPr/>
                 <a14:m>
                   <m:oMathPara xmlns:m="http://schemas.openxmlformats.org/officeDocument/2006/math">
                     <m:oMathParaPr>
@@ -4625,7 +4627,7 @@
             </p:txBody>
           </p:sp>
         </mc:Choice>
-        <mc:Fallback>
+        <mc:Fallback xmlns="">
           <p:sp>
             <p:nvSpPr>
               <p:cNvPr id="70" name="TextBox 69"/>
@@ -4664,86 +4666,113 @@
           </p:sp>
         </mc:Fallback>
       </mc:AlternateContent>
-      <p:sp>
-        <p:nvSpPr>
-          <p:cNvPr id="77" name="TextBox 76"/>
-          <p:cNvSpPr txBox="1"/>
-          <p:nvPr/>
-        </p:nvSpPr>
-        <p:spPr>
-          <a:xfrm>
-            <a:off x="5719000" y="2635618"/>
-            <a:ext cx="205486" cy="286447"/>
-          </a:xfrm>
-          <a:prstGeom prst="rect">
-            <a:avLst/>
-          </a:prstGeom>
-          <a:noFill/>
-        </p:spPr>
-        <p:txBody>
-          <a:bodyPr wrap="square" rtlCol="0">
-            <a:spAutoFit/>
-          </a:bodyPr>
-          <a:lstStyle/>
-          <a:p>
-            <a:r>
-              <a:rPr lang="en-US" sz="1200" dirty="0" smtClean="0">
-                <a:solidFill>
-                  <a:schemeClr val="tx1"/>
-                </a:solidFill>
-                <a:latin typeface="cmbx12" panose="020B0500000000000000" pitchFamily="34" charset="0"/>
-              </a:rPr>
-              <a:t>z</a:t>
-            </a:r>
-            <a:endParaRPr lang="en-US" sz="1200" dirty="0">
-              <a:solidFill>
-                <a:schemeClr val="tx1"/>
-              </a:solidFill>
-              <a:latin typeface="cmbx12" panose="020B0500000000000000" pitchFamily="34" charset="0"/>
-            </a:endParaRPr>
-          </a:p>
-        </p:txBody>
-      </p:sp>
-      <p:sp>
-        <p:nvSpPr>
-          <p:cNvPr id="78" name="TextBox 77"/>
-          <p:cNvSpPr txBox="1"/>
-          <p:nvPr/>
-        </p:nvSpPr>
-        <p:spPr>
-          <a:xfrm>
-            <a:off x="5719000" y="398982"/>
-            <a:ext cx="205486" cy="286447"/>
-          </a:xfrm>
-          <a:prstGeom prst="rect">
-            <a:avLst/>
-          </a:prstGeom>
-          <a:noFill/>
-        </p:spPr>
-        <p:txBody>
-          <a:bodyPr wrap="square" rtlCol="0">
-            <a:spAutoFit/>
-          </a:bodyPr>
-          <a:lstStyle/>
-          <a:p>
-            <a:r>
-              <a:rPr lang="en-US" sz="1200" dirty="0" smtClean="0">
-                <a:solidFill>
-                  <a:schemeClr val="tx1"/>
-                </a:solidFill>
-                <a:latin typeface="cmbx12" panose="020B0500000000000000" pitchFamily="34" charset="0"/>
-              </a:rPr>
-              <a:t>z</a:t>
-            </a:r>
-            <a:endParaRPr lang="en-US" sz="1200" dirty="0">
-              <a:solidFill>
-                <a:schemeClr val="tx1"/>
-              </a:solidFill>
-              <a:latin typeface="cmbx12" panose="020B0500000000000000" pitchFamily="34" charset="0"/>
-            </a:endParaRPr>
-          </a:p>
-        </p:txBody>
-      </p:sp>
+      <mc:AlternateContent xmlns:mc="http://schemas.openxmlformats.org/markup-compatibility/2006">
+        <mc:Choice xmlns:a14="http://schemas.microsoft.com/office/drawing/2010/main" Requires="a14">
+          <p:sp>
+            <p:nvSpPr>
+              <p:cNvPr id="77" name="TextBox 76"/>
+              <p:cNvSpPr txBox="1"/>
+              <p:nvPr/>
+            </p:nvSpPr>
+            <p:spPr>
+              <a:xfrm>
+                <a:off x="5674396" y="2635618"/>
+                <a:ext cx="205486" cy="286447"/>
+              </a:xfrm>
+              <a:prstGeom prst="rect">
+                <a:avLst/>
+              </a:prstGeom>
+              <a:noFill/>
+            </p:spPr>
+            <p:txBody>
+              <a:bodyPr wrap="square" rtlCol="0">
+                <a:spAutoFit/>
+              </a:bodyPr>
+              <a:lstStyle/>
+              <a:p>
+                <a14:m>
+                  <m:oMathPara xmlns:m="http://schemas.openxmlformats.org/officeDocument/2006/math">
+                    <m:oMathParaPr>
+                      <m:jc m:val="centerGroup"/>
+                    </m:oMathParaPr>
+                    <m:oMath xmlns:m="http://schemas.openxmlformats.org/officeDocument/2006/math">
+                      <m:sSub>
+                        <m:sSubPr>
+                          <m:ctrlPr>
+                            <a:rPr lang="en-US" sz="1200" i="1" smtClean="0">
+                              <a:latin typeface="Cambria Math" panose="02040503050406030204" pitchFamily="18" charset="0"/>
+                            </a:rPr>
+                          </m:ctrlPr>
+                        </m:sSubPr>
+                        <m:e>
+                          <m:r>
+                            <a:rPr lang="en-US" sz="1200" b="0" i="1" smtClean="0">
+                              <a:latin typeface="Cambria Math" panose="02040503050406030204" pitchFamily="18" charset="0"/>
+                            </a:rPr>
+                            <m:t>𝑒</m:t>
+                          </m:r>
+                        </m:e>
+                        <m:sub>
+                          <m:r>
+                            <a:rPr lang="en-US" sz="1200" b="0" i="1" smtClean="0">
+                              <a:latin typeface="Cambria Math" panose="02040503050406030204" pitchFamily="18" charset="0"/>
+                            </a:rPr>
+                            <m:t>𝑧</m:t>
+                          </m:r>
+                        </m:sub>
+                      </m:sSub>
+                    </m:oMath>
+                  </m:oMathPara>
+                </a14:m>
+                <a:endParaRPr lang="en-US" sz="1200" dirty="0">
+                  <a:solidFill>
+                    <a:schemeClr val="tx1"/>
+                  </a:solidFill>
+                  <a:latin typeface="cmbx12" panose="020B0500000000000000" pitchFamily="34" charset="0"/>
+                </a:endParaRPr>
+              </a:p>
+            </p:txBody>
+          </p:sp>
+        </mc:Choice>
+        <mc:Fallback>
+          <p:sp>
+            <p:nvSpPr>
+              <p:cNvPr id="77" name="TextBox 76"/>
+              <p:cNvSpPr txBox="1">
+                <a:spLocks noRot="1" noChangeAspect="1" noMove="1" noResize="1" noEditPoints="1" noAdjustHandles="1" noChangeArrowheads="1" noChangeShapeType="1" noTextEdit="1"/>
+              </p:cNvSpPr>
+              <p:nvPr/>
+            </p:nvSpPr>
+            <p:spPr>
+              <a:xfrm>
+                <a:off x="5674396" y="2635618"/>
+                <a:ext cx="205486" cy="286447"/>
+              </a:xfrm>
+              <a:prstGeom prst="rect">
+                <a:avLst/>
+              </a:prstGeom>
+              <a:blipFill rotWithShape="0">
+                <a:blip r:embed="rId6"/>
+                <a:stretch>
+                  <a:fillRect r="-20588"/>
+                </a:stretch>
+              </a:blipFill>
+            </p:spPr>
+            <p:txBody>
+              <a:bodyPr/>
+              <a:lstStyle/>
+              <a:p>
+                <a:r>
+                  <a:rPr lang="en-US">
+                    <a:noFill/>
+                  </a:rPr>
+                  <a:t> </a:t>
+                </a:r>
+              </a:p>
+            </p:txBody>
+          </p:sp>
+        </mc:Fallback>
+      </mc:AlternateContent>
       <p:cxnSp>
         <p:nvCxnSpPr>
           <p:cNvPr id="81" name="Curved Connector 80"/>
@@ -5078,6 +5107,113 @@
           </a:fontRef>
         </p:style>
       </p:cxnSp>
+      <mc:AlternateContent xmlns:mc="http://schemas.openxmlformats.org/markup-compatibility/2006">
+        <mc:Choice xmlns:a14="http://schemas.microsoft.com/office/drawing/2010/main" Requires="a14">
+          <p:sp>
+            <p:nvSpPr>
+              <p:cNvPr id="45" name="TextBox 44"/>
+              <p:cNvSpPr txBox="1"/>
+              <p:nvPr/>
+            </p:nvSpPr>
+            <p:spPr>
+              <a:xfrm>
+                <a:off x="5672623" y="391112"/>
+                <a:ext cx="205486" cy="286447"/>
+              </a:xfrm>
+              <a:prstGeom prst="rect">
+                <a:avLst/>
+              </a:prstGeom>
+              <a:noFill/>
+            </p:spPr>
+            <p:txBody>
+              <a:bodyPr wrap="square" rtlCol="0">
+                <a:spAutoFit/>
+              </a:bodyPr>
+              <a:lstStyle/>
+              <a:p>
+                <a14:m>
+                  <m:oMathPara xmlns:m="http://schemas.openxmlformats.org/officeDocument/2006/math">
+                    <m:oMathParaPr>
+                      <m:jc m:val="centerGroup"/>
+                    </m:oMathParaPr>
+                    <m:oMath xmlns:m="http://schemas.openxmlformats.org/officeDocument/2006/math">
+                      <m:sSub>
+                        <m:sSubPr>
+                          <m:ctrlPr>
+                            <a:rPr lang="en-US" sz="1200" i="1" smtClean="0">
+                              <a:latin typeface="Cambria Math" panose="02040503050406030204" pitchFamily="18" charset="0"/>
+                            </a:rPr>
+                          </m:ctrlPr>
+                        </m:sSubPr>
+                        <m:e>
+                          <m:r>
+                            <a:rPr lang="en-US" sz="1200" b="0" i="1" smtClean="0">
+                              <a:latin typeface="Cambria Math" panose="02040503050406030204" pitchFamily="18" charset="0"/>
+                            </a:rPr>
+                            <m:t>𝑒</m:t>
+                          </m:r>
+                        </m:e>
+                        <m:sub>
+                          <m:r>
+                            <a:rPr lang="en-US" sz="1200" b="0" i="1" smtClean="0">
+                              <a:latin typeface="Cambria Math" panose="02040503050406030204" pitchFamily="18" charset="0"/>
+                            </a:rPr>
+                            <m:t>𝑧</m:t>
+                          </m:r>
+                        </m:sub>
+                      </m:sSub>
+                    </m:oMath>
+                  </m:oMathPara>
+                </a14:m>
+                <a:endParaRPr lang="en-US" sz="1200" dirty="0">
+                  <a:solidFill>
+                    <a:schemeClr val="tx1"/>
+                  </a:solidFill>
+                  <a:latin typeface="cmbx12" panose="020B0500000000000000" pitchFamily="34" charset="0"/>
+                </a:endParaRPr>
+              </a:p>
+            </p:txBody>
+          </p:sp>
+        </mc:Choice>
+        <mc:Fallback>
+          <p:sp>
+            <p:nvSpPr>
+              <p:cNvPr id="45" name="TextBox 44"/>
+              <p:cNvSpPr txBox="1">
+                <a:spLocks noRot="1" noChangeAspect="1" noMove="1" noResize="1" noEditPoints="1" noAdjustHandles="1" noChangeArrowheads="1" noChangeShapeType="1" noTextEdit="1"/>
+              </p:cNvSpPr>
+              <p:nvPr/>
+            </p:nvSpPr>
+            <p:spPr>
+              <a:xfrm>
+                <a:off x="5672623" y="391112"/>
+                <a:ext cx="205486" cy="286447"/>
+              </a:xfrm>
+              <a:prstGeom prst="rect">
+                <a:avLst/>
+              </a:prstGeom>
+              <a:blipFill rotWithShape="0">
+                <a:blip r:embed="rId6"/>
+                <a:stretch>
+                  <a:fillRect r="-24242"/>
+                </a:stretch>
+              </a:blipFill>
+            </p:spPr>
+            <p:txBody>
+              <a:bodyPr/>
+              <a:lstStyle/>
+              <a:p>
+                <a:r>
+                  <a:rPr lang="en-US">
+                    <a:noFill/>
+                  </a:rPr>
+                  <a:t> </a:t>
+                </a:r>
+              </a:p>
+            </p:txBody>
+          </p:sp>
+        </mc:Fallback>
+      </mc:AlternateContent>
     </p:spTree>
     <p:extLst>
       <p:ext uri="{BB962C8B-B14F-4D97-AF65-F5344CB8AC3E}">
@@ -5108,6 +5244,845 @@
           <a:chExt cx="0" cy="0"/>
         </a:xfrm>
       </p:grpSpPr>
+      <p:sp>
+        <p:nvSpPr>
+          <p:cNvPr id="10" name="Oval 9"/>
+          <p:cNvSpPr/>
+          <p:nvPr/>
+        </p:nvSpPr>
+        <p:spPr>
+          <a:xfrm>
+            <a:off x="2212263" y="3964264"/>
+            <a:ext cx="2095308" cy="2093976"/>
+          </a:xfrm>
+          <a:prstGeom prst="ellipse">
+            <a:avLst/>
+          </a:prstGeom>
+          <a:pattFill prst="pct10">
+            <a:fgClr>
+              <a:schemeClr val="accent1"/>
+            </a:fgClr>
+            <a:bgClr>
+              <a:schemeClr val="bg1"/>
+            </a:bgClr>
+          </a:pattFill>
+          <a:ln>
+            <a:noFill/>
+          </a:ln>
+        </p:spPr>
+        <p:style>
+          <a:lnRef idx="2">
+            <a:schemeClr val="accent1">
+              <a:shade val="50000"/>
+            </a:schemeClr>
+          </a:lnRef>
+          <a:fillRef idx="1">
+            <a:schemeClr val="accent1"/>
+          </a:fillRef>
+          <a:effectRef idx="0">
+            <a:schemeClr val="accent1"/>
+          </a:effectRef>
+          <a:fontRef idx="minor">
+            <a:schemeClr val="lt1"/>
+          </a:fontRef>
+        </p:style>
+        <p:txBody>
+          <a:bodyPr rtlCol="0" anchor="ctr"/>
+          <a:lstStyle/>
+          <a:p>
+            <a:pPr algn="ctr"/>
+            <a:endParaRPr lang="en-US"/>
+          </a:p>
+        </p:txBody>
+      </p:sp>
+      <p:sp>
+        <p:nvSpPr>
+          <p:cNvPr id="8" name="Oval 7"/>
+          <p:cNvSpPr/>
+          <p:nvPr/>
+        </p:nvSpPr>
+        <p:spPr>
+          <a:xfrm>
+            <a:off x="5192973" y="2405509"/>
+            <a:ext cx="856403" cy="859536"/>
+          </a:xfrm>
+          <a:prstGeom prst="ellipse">
+            <a:avLst/>
+          </a:prstGeom>
+          <a:gradFill>
+            <a:gsLst>
+              <a:gs pos="0">
+                <a:schemeClr val="accent1">
+                  <a:lumMod val="5000"/>
+                  <a:lumOff val="95000"/>
+                </a:schemeClr>
+              </a:gs>
+              <a:gs pos="71000">
+                <a:schemeClr val="bg1"/>
+              </a:gs>
+              <a:gs pos="83000">
+                <a:schemeClr val="accent1">
+                  <a:lumMod val="45000"/>
+                  <a:lumOff val="55000"/>
+                </a:schemeClr>
+              </a:gs>
+              <a:gs pos="100000">
+                <a:schemeClr val="accent1">
+                  <a:lumMod val="30000"/>
+                  <a:lumOff val="70000"/>
+                </a:schemeClr>
+              </a:gs>
+            </a:gsLst>
+            <a:lin ang="5400000" scaled="1"/>
+          </a:gradFill>
+          <a:ln>
+            <a:gradFill>
+              <a:gsLst>
+                <a:gs pos="0">
+                  <a:schemeClr val="accent1">
+                    <a:lumMod val="5000"/>
+                    <a:lumOff val="95000"/>
+                  </a:schemeClr>
+                </a:gs>
+                <a:gs pos="74000">
+                  <a:schemeClr val="accent1">
+                    <a:lumMod val="45000"/>
+                    <a:lumOff val="55000"/>
+                  </a:schemeClr>
+                </a:gs>
+                <a:gs pos="83000">
+                  <a:schemeClr val="accent1">
+                    <a:lumMod val="45000"/>
+                    <a:lumOff val="55000"/>
+                  </a:schemeClr>
+                </a:gs>
+                <a:gs pos="100000">
+                  <a:schemeClr val="accent1">
+                    <a:lumMod val="30000"/>
+                    <a:lumOff val="70000"/>
+                  </a:schemeClr>
+                </a:gs>
+              </a:gsLst>
+              <a:lin ang="5400000" scaled="1"/>
+            </a:gradFill>
+          </a:ln>
+          <a:scene3d>
+            <a:camera prst="orthographicFront">
+              <a:rot lat="0" lon="0" rev="0"/>
+            </a:camera>
+            <a:lightRig rig="threePt" dir="t"/>
+          </a:scene3d>
+          <a:sp3d prstMaterial="powder">
+            <a:bevelT w="889000" h="889000"/>
+            <a:bevelB w="889000" h="889000"/>
+          </a:sp3d>
+        </p:spPr>
+        <p:style>
+          <a:lnRef idx="2">
+            <a:schemeClr val="accent1">
+              <a:shade val="50000"/>
+            </a:schemeClr>
+          </a:lnRef>
+          <a:fillRef idx="1">
+            <a:schemeClr val="accent1"/>
+          </a:fillRef>
+          <a:effectRef idx="0">
+            <a:schemeClr val="accent1"/>
+          </a:effectRef>
+          <a:fontRef idx="minor">
+            <a:schemeClr val="lt1"/>
+          </a:fontRef>
+        </p:style>
+        <p:txBody>
+          <a:bodyPr rtlCol="0" anchor="ctr"/>
+          <a:lstStyle/>
+          <a:p>
+            <a:pPr algn="ctr"/>
+            <a:endParaRPr lang="en-US"/>
+          </a:p>
+        </p:txBody>
+      </p:sp>
+      <p:sp>
+        <p:nvSpPr>
+          <p:cNvPr id="2" name="Oval 1"/>
+          <p:cNvSpPr/>
+          <p:nvPr/>
+        </p:nvSpPr>
+        <p:spPr>
+          <a:xfrm>
+            <a:off x="3122087" y="2835277"/>
+            <a:ext cx="206829" cy="217714"/>
+          </a:xfrm>
+          <a:prstGeom prst="ellipse">
+            <a:avLst/>
+          </a:prstGeom>
+          <a:scene3d>
+            <a:camera prst="orthographicFront">
+              <a:rot lat="0" lon="0" rev="0"/>
+            </a:camera>
+            <a:lightRig rig="threePt" dir="t"/>
+          </a:scene3d>
+          <a:sp3d>
+            <a:bevelT w="127000" h="133350"/>
+            <a:bevelB w="127000" h="127000"/>
+          </a:sp3d>
+        </p:spPr>
+        <p:style>
+          <a:lnRef idx="2">
+            <a:schemeClr val="accent1">
+              <a:shade val="50000"/>
+            </a:schemeClr>
+          </a:lnRef>
+          <a:fillRef idx="1">
+            <a:schemeClr val="accent1"/>
+          </a:fillRef>
+          <a:effectRef idx="0">
+            <a:schemeClr val="accent1"/>
+          </a:effectRef>
+          <a:fontRef idx="minor">
+            <a:schemeClr val="lt1"/>
+          </a:fontRef>
+        </p:style>
+        <p:txBody>
+          <a:bodyPr rtlCol="0" anchor="ctr"/>
+          <a:lstStyle/>
+          <a:p>
+            <a:pPr algn="ctr"/>
+            <a:endParaRPr lang="en-US"/>
+          </a:p>
+        </p:txBody>
+      </p:sp>
+      <p:sp>
+        <p:nvSpPr>
+          <p:cNvPr id="3" name="Oval 2"/>
+          <p:cNvSpPr/>
+          <p:nvPr/>
+        </p:nvSpPr>
+        <p:spPr>
+          <a:xfrm>
+            <a:off x="2212263" y="4782652"/>
+            <a:ext cx="457200" cy="457200"/>
+          </a:xfrm>
+          <a:prstGeom prst="ellipse">
+            <a:avLst/>
+          </a:prstGeom>
+          <a:pattFill prst="pct50">
+            <a:fgClr>
+              <a:schemeClr val="accent1">
+                <a:lumMod val="75000"/>
+              </a:schemeClr>
+            </a:fgClr>
+            <a:bgClr>
+              <a:schemeClr val="bg1"/>
+            </a:bgClr>
+          </a:pattFill>
+          <a:ln>
+            <a:noFill/>
+          </a:ln>
+          <a:scene3d>
+            <a:camera prst="orthographicFront">
+              <a:rot lat="0" lon="0" rev="0"/>
+            </a:camera>
+            <a:lightRig rig="threePt" dir="t"/>
+          </a:scene3d>
+          <a:sp3d prstMaterial="matte">
+            <a:bevelT w="254000" h="254000"/>
+            <a:bevelB w="254000" h="254000"/>
+          </a:sp3d>
+        </p:spPr>
+        <p:style>
+          <a:lnRef idx="2">
+            <a:schemeClr val="accent1">
+              <a:shade val="50000"/>
+            </a:schemeClr>
+          </a:lnRef>
+          <a:fillRef idx="1">
+            <a:schemeClr val="accent1"/>
+          </a:fillRef>
+          <a:effectRef idx="0">
+            <a:schemeClr val="accent1"/>
+          </a:effectRef>
+          <a:fontRef idx="minor">
+            <a:schemeClr val="lt1"/>
+          </a:fontRef>
+        </p:style>
+        <p:txBody>
+          <a:bodyPr rtlCol="0" anchor="ctr"/>
+          <a:lstStyle/>
+          <a:p>
+            <a:pPr algn="ctr"/>
+            <a:endParaRPr lang="en-US"/>
+          </a:p>
+        </p:txBody>
+      </p:sp>
+      <p:sp>
+        <p:nvSpPr>
+          <p:cNvPr id="4" name="Oval 3"/>
+          <p:cNvSpPr/>
+          <p:nvPr/>
+        </p:nvSpPr>
+        <p:spPr>
+          <a:xfrm rot="10373843">
+            <a:off x="7916853" y="1644246"/>
+            <a:ext cx="2072644" cy="1692322"/>
+          </a:xfrm>
+          <a:prstGeom prst="ellipse">
+            <a:avLst/>
+          </a:prstGeom>
+          <a:solidFill>
+            <a:schemeClr val="accent1">
+              <a:alpha val="46000"/>
+            </a:schemeClr>
+          </a:solidFill>
+          <a:ln>
+            <a:noFill/>
+          </a:ln>
+          <a:effectLst>
+            <a:softEdge rad="0"/>
+          </a:effectLst>
+          <a:scene3d>
+            <a:camera prst="orthographicFront">
+              <a:rot lat="300003" lon="0" rev="0"/>
+            </a:camera>
+            <a:lightRig rig="threePt" dir="t"/>
+          </a:scene3d>
+          <a:sp3d extrusionH="76200" contourW="12700">
+            <a:bevelT w="1619250" h="1352550"/>
+            <a:bevelB w="635000" h="635000"/>
+            <a:extrusionClr>
+              <a:schemeClr val="accent1">
+                <a:lumMod val="40000"/>
+                <a:lumOff val="60000"/>
+              </a:schemeClr>
+            </a:extrusionClr>
+            <a:contourClr>
+              <a:schemeClr val="bg1"/>
+            </a:contourClr>
+          </a:sp3d>
+        </p:spPr>
+        <p:style>
+          <a:lnRef idx="2">
+            <a:schemeClr val="accent1">
+              <a:shade val="50000"/>
+            </a:schemeClr>
+          </a:lnRef>
+          <a:fillRef idx="1">
+            <a:schemeClr val="accent1"/>
+          </a:fillRef>
+          <a:effectRef idx="0">
+            <a:schemeClr val="accent1"/>
+          </a:effectRef>
+          <a:fontRef idx="minor">
+            <a:schemeClr val="lt1"/>
+          </a:fontRef>
+        </p:style>
+        <p:txBody>
+          <a:bodyPr rtlCol="0" anchor="ctr"/>
+          <a:lstStyle/>
+          <a:p>
+            <a:pPr algn="ctr"/>
+            <a:endParaRPr lang="en-US"/>
+          </a:p>
+        </p:txBody>
+      </p:sp>
+      <p:sp>
+        <p:nvSpPr>
+          <p:cNvPr id="5" name="Oval 4"/>
+          <p:cNvSpPr/>
+          <p:nvPr/>
+        </p:nvSpPr>
+        <p:spPr>
+          <a:xfrm>
+            <a:off x="3847996" y="4782652"/>
+            <a:ext cx="457200" cy="457200"/>
+          </a:xfrm>
+          <a:prstGeom prst="ellipse">
+            <a:avLst/>
+          </a:prstGeom>
+          <a:pattFill prst="pct50">
+            <a:fgClr>
+              <a:schemeClr val="accent1">
+                <a:lumMod val="75000"/>
+              </a:schemeClr>
+            </a:fgClr>
+            <a:bgClr>
+              <a:schemeClr val="bg1"/>
+            </a:bgClr>
+          </a:pattFill>
+          <a:ln>
+            <a:noFill/>
+          </a:ln>
+          <a:scene3d>
+            <a:camera prst="orthographicFront">
+              <a:rot lat="0" lon="0" rev="0"/>
+            </a:camera>
+            <a:lightRig rig="threePt" dir="t"/>
+          </a:scene3d>
+          <a:sp3d prstMaterial="matte">
+            <a:bevelT w="254000" h="254000"/>
+            <a:bevelB w="254000" h="254000"/>
+          </a:sp3d>
+        </p:spPr>
+        <p:style>
+          <a:lnRef idx="2">
+            <a:schemeClr val="accent1">
+              <a:shade val="50000"/>
+            </a:schemeClr>
+          </a:lnRef>
+          <a:fillRef idx="1">
+            <a:schemeClr val="accent1"/>
+          </a:fillRef>
+          <a:effectRef idx="0">
+            <a:schemeClr val="accent1"/>
+          </a:effectRef>
+          <a:fontRef idx="minor">
+            <a:schemeClr val="lt1"/>
+          </a:fontRef>
+        </p:style>
+        <p:txBody>
+          <a:bodyPr rtlCol="0" anchor="ctr"/>
+          <a:lstStyle/>
+          <a:p>
+            <a:pPr algn="ctr"/>
+            <a:endParaRPr lang="en-US"/>
+          </a:p>
+        </p:txBody>
+      </p:sp>
+      <p:sp>
+        <p:nvSpPr>
+          <p:cNvPr id="6" name="Oval 5"/>
+          <p:cNvSpPr/>
+          <p:nvPr/>
+        </p:nvSpPr>
+        <p:spPr>
+          <a:xfrm>
+            <a:off x="4307571" y="855755"/>
+            <a:ext cx="1770803" cy="1773936"/>
+          </a:xfrm>
+          <a:prstGeom prst="ellipse">
+            <a:avLst/>
+          </a:prstGeom>
+          <a:solidFill>
+            <a:schemeClr val="accent1">
+              <a:lumMod val="75000"/>
+              <a:alpha val="28000"/>
+            </a:schemeClr>
+          </a:solidFill>
+          <a:ln w="457200">
+            <a:gradFill>
+              <a:gsLst>
+                <a:gs pos="0">
+                  <a:schemeClr val="accent1">
+                    <a:lumMod val="5000"/>
+                    <a:lumOff val="95000"/>
+                    <a:alpha val="0"/>
+                  </a:schemeClr>
+                </a:gs>
+                <a:gs pos="74000">
+                  <a:schemeClr val="accent1">
+                    <a:lumMod val="45000"/>
+                    <a:lumOff val="55000"/>
+                  </a:schemeClr>
+                </a:gs>
+                <a:gs pos="83000">
+                  <a:schemeClr val="accent1">
+                    <a:lumMod val="45000"/>
+                    <a:lumOff val="55000"/>
+                  </a:schemeClr>
+                </a:gs>
+                <a:gs pos="100000">
+                  <a:schemeClr val="accent1">
+                    <a:lumMod val="30000"/>
+                    <a:lumOff val="70000"/>
+                  </a:schemeClr>
+                </a:gs>
+              </a:gsLst>
+              <a:lin ang="5400000" scaled="1"/>
+            </a:gradFill>
+          </a:ln>
+          <a:scene3d>
+            <a:camera prst="orthographicFront">
+              <a:rot lat="0" lon="16199975" rev="0"/>
+            </a:camera>
+            <a:lightRig rig="threePt" dir="t"/>
+          </a:scene3d>
+          <a:sp3d prstMaterial="matte">
+            <a:bevelT w="889000" h="889000"/>
+            <a:bevelB w="1143000" h="1143000"/>
+          </a:sp3d>
+        </p:spPr>
+        <p:style>
+          <a:lnRef idx="2">
+            <a:schemeClr val="accent1">
+              <a:shade val="50000"/>
+            </a:schemeClr>
+          </a:lnRef>
+          <a:fillRef idx="1">
+            <a:schemeClr val="accent1"/>
+          </a:fillRef>
+          <a:effectRef idx="0">
+            <a:schemeClr val="accent1"/>
+          </a:effectRef>
+          <a:fontRef idx="minor">
+            <a:schemeClr val="lt1"/>
+          </a:fontRef>
+        </p:style>
+        <p:txBody>
+          <a:bodyPr rtlCol="0" anchor="ctr"/>
+          <a:lstStyle/>
+          <a:p>
+            <a:pPr algn="ctr"/>
+            <a:endParaRPr lang="en-US"/>
+          </a:p>
+        </p:txBody>
+      </p:sp>
+      <p:sp>
+        <p:nvSpPr>
+          <p:cNvPr id="11" name="Oval 10"/>
+          <p:cNvSpPr/>
+          <p:nvPr/>
+        </p:nvSpPr>
+        <p:spPr>
+          <a:xfrm>
+            <a:off x="2669463" y="4421464"/>
+            <a:ext cx="1180908" cy="1179576"/>
+          </a:xfrm>
+          <a:prstGeom prst="ellipse">
+            <a:avLst/>
+          </a:prstGeom>
+          <a:solidFill>
+            <a:schemeClr val="bg1"/>
+          </a:solidFill>
+          <a:ln>
+            <a:noFill/>
+          </a:ln>
+        </p:spPr>
+        <p:style>
+          <a:lnRef idx="2">
+            <a:schemeClr val="accent1">
+              <a:shade val="50000"/>
+            </a:schemeClr>
+          </a:lnRef>
+          <a:fillRef idx="1">
+            <a:schemeClr val="accent1"/>
+          </a:fillRef>
+          <a:effectRef idx="0">
+            <a:schemeClr val="accent1"/>
+          </a:effectRef>
+          <a:fontRef idx="minor">
+            <a:schemeClr val="lt1"/>
+          </a:fontRef>
+        </p:style>
+        <p:txBody>
+          <a:bodyPr rtlCol="0" anchor="ctr"/>
+          <a:lstStyle/>
+          <a:p>
+            <a:pPr algn="ctr"/>
+            <a:endParaRPr lang="en-US"/>
+          </a:p>
+        </p:txBody>
+      </p:sp>
+      <p:sp>
+        <p:nvSpPr>
+          <p:cNvPr id="12" name="Right Arrow 11"/>
+          <p:cNvSpPr/>
+          <p:nvPr/>
+        </p:nvSpPr>
+        <p:spPr>
+          <a:xfrm>
+            <a:off x="1326863" y="4725675"/>
+            <a:ext cx="802887" cy="571155"/>
+          </a:xfrm>
+          <a:prstGeom prst="rightArrow">
+            <a:avLst/>
+          </a:prstGeom>
+        </p:spPr>
+        <p:style>
+          <a:lnRef idx="2">
+            <a:schemeClr val="accent1">
+              <a:shade val="50000"/>
+            </a:schemeClr>
+          </a:lnRef>
+          <a:fillRef idx="1">
+            <a:schemeClr val="accent1"/>
+          </a:fillRef>
+          <a:effectRef idx="0">
+            <a:schemeClr val="accent1"/>
+          </a:effectRef>
+          <a:fontRef idx="minor">
+            <a:schemeClr val="lt1"/>
+          </a:fontRef>
+        </p:style>
+        <p:txBody>
+          <a:bodyPr rtlCol="0" anchor="ctr"/>
+          <a:lstStyle/>
+          <a:p>
+            <a:pPr algn="ctr"/>
+            <a:endParaRPr lang="en-US"/>
+          </a:p>
+        </p:txBody>
+      </p:sp>
+      <p:sp>
+        <p:nvSpPr>
+          <p:cNvPr id="13" name="Right Arrow 12"/>
+          <p:cNvSpPr/>
+          <p:nvPr/>
+        </p:nvSpPr>
+        <p:spPr>
+          <a:xfrm rot="10800000">
+            <a:off x="4390085" y="4725674"/>
+            <a:ext cx="802887" cy="571155"/>
+          </a:xfrm>
+          <a:prstGeom prst="rightArrow">
+            <a:avLst/>
+          </a:prstGeom>
+        </p:spPr>
+        <p:style>
+          <a:lnRef idx="2">
+            <a:schemeClr val="accent1">
+              <a:shade val="50000"/>
+            </a:schemeClr>
+          </a:lnRef>
+          <a:fillRef idx="1">
+            <a:schemeClr val="accent1"/>
+          </a:fillRef>
+          <a:effectRef idx="0">
+            <a:schemeClr val="accent1"/>
+          </a:effectRef>
+          <a:fontRef idx="minor">
+            <a:schemeClr val="lt1"/>
+          </a:fontRef>
+        </p:style>
+        <p:txBody>
+          <a:bodyPr rtlCol="0" anchor="ctr"/>
+          <a:lstStyle/>
+          <a:p>
+            <a:pPr algn="ctr"/>
+            <a:endParaRPr lang="en-US"/>
+          </a:p>
+        </p:txBody>
+      </p:sp>
+      <p:sp>
+        <p:nvSpPr>
+          <p:cNvPr id="15" name="TextBox 14"/>
+          <p:cNvSpPr txBox="1"/>
+          <p:nvPr/>
+        </p:nvSpPr>
+        <p:spPr>
+          <a:xfrm>
+            <a:off x="1258702" y="4876462"/>
+            <a:ext cx="1159859" cy="276999"/>
+          </a:xfrm>
+          <a:prstGeom prst="rect">
+            <a:avLst/>
+          </a:prstGeom>
+          <a:noFill/>
+        </p:spPr>
+        <p:txBody>
+          <a:bodyPr wrap="square" rtlCol="0">
+            <a:spAutoFit/>
+          </a:bodyPr>
+          <a:lstStyle/>
+          <a:p>
+            <a:r>
+              <a:rPr lang="en-US" sz="1200" dirty="0" smtClean="0">
+                <a:latin typeface="cmbx12" panose="020B0500000000000000" pitchFamily="34" charset="0"/>
+              </a:rPr>
+              <a:t>1D lattice</a:t>
+            </a:r>
+            <a:endParaRPr lang="en-US" sz="1200" dirty="0">
+              <a:latin typeface="cmbx12" panose="020B0500000000000000" pitchFamily="34" charset="0"/>
+            </a:endParaRPr>
+          </a:p>
+        </p:txBody>
+      </p:sp>
+      <p:sp>
+        <p:nvSpPr>
+          <p:cNvPr id="16" name="TextBox 15"/>
+          <p:cNvSpPr txBox="1"/>
+          <p:nvPr/>
+        </p:nvSpPr>
+        <p:spPr>
+          <a:xfrm>
+            <a:off x="4367782" y="4876462"/>
+            <a:ext cx="1159859" cy="276999"/>
+          </a:xfrm>
+          <a:prstGeom prst="rect">
+            <a:avLst/>
+          </a:prstGeom>
+          <a:noFill/>
+        </p:spPr>
+        <p:txBody>
+          <a:bodyPr wrap="square" rtlCol="0">
+            <a:spAutoFit/>
+          </a:bodyPr>
+          <a:lstStyle/>
+          <a:p>
+            <a:r>
+              <a:rPr lang="en-US" sz="1200" dirty="0" smtClean="0">
+                <a:latin typeface="cmbx12" panose="020B0500000000000000" pitchFamily="34" charset="0"/>
+              </a:rPr>
+              <a:t>1D lattice</a:t>
+            </a:r>
+            <a:endParaRPr lang="en-US" sz="1200" dirty="0">
+              <a:latin typeface="cmbx12" panose="020B0500000000000000" pitchFamily="34" charset="0"/>
+            </a:endParaRPr>
+          </a:p>
+        </p:txBody>
+      </p:sp>
+      <p:cxnSp>
+        <p:nvCxnSpPr>
+          <p:cNvPr id="18" name="Straight Arrow Connector 17"/>
+          <p:cNvCxnSpPr/>
+          <p:nvPr/>
+        </p:nvCxnSpPr>
+        <p:spPr>
+          <a:xfrm>
+            <a:off x="4802679" y="5779458"/>
+            <a:ext cx="411480" cy="0"/>
+          </a:xfrm>
+          <a:prstGeom prst="straightConnector1">
+            <a:avLst/>
+          </a:prstGeom>
+          <a:ln w="12700">
+            <a:tailEnd type="triangle"/>
+          </a:ln>
+        </p:spPr>
+        <p:style>
+          <a:lnRef idx="1">
+            <a:schemeClr val="accent1"/>
+          </a:lnRef>
+          <a:fillRef idx="0">
+            <a:schemeClr val="accent1"/>
+          </a:fillRef>
+          <a:effectRef idx="0">
+            <a:schemeClr val="accent1"/>
+          </a:effectRef>
+          <a:fontRef idx="minor">
+            <a:schemeClr val="tx1"/>
+          </a:fontRef>
+        </p:style>
+      </p:cxnSp>
+      <p:cxnSp>
+        <p:nvCxnSpPr>
+          <p:cNvPr id="20" name="Straight Arrow Connector 19"/>
+          <p:cNvCxnSpPr/>
+          <p:nvPr/>
+        </p:nvCxnSpPr>
+        <p:spPr>
+          <a:xfrm flipH="1" flipV="1">
+            <a:off x="4791528" y="5370624"/>
+            <a:ext cx="7722" cy="408835"/>
+          </a:xfrm>
+          <a:prstGeom prst="straightConnector1">
+            <a:avLst/>
+          </a:prstGeom>
+          <a:ln w="12700">
+            <a:tailEnd type="triangle"/>
+          </a:ln>
+        </p:spPr>
+        <p:style>
+          <a:lnRef idx="1">
+            <a:schemeClr val="accent1"/>
+          </a:lnRef>
+          <a:fillRef idx="0">
+            <a:schemeClr val="accent1"/>
+          </a:fillRef>
+          <a:effectRef idx="0">
+            <a:schemeClr val="accent1"/>
+          </a:effectRef>
+          <a:fontRef idx="minor">
+            <a:schemeClr val="tx1"/>
+          </a:fontRef>
+        </p:style>
+      </p:cxnSp>
+      <p:sp>
+        <p:nvSpPr>
+          <p:cNvPr id="24" name="Oval 23"/>
+          <p:cNvSpPr/>
+          <p:nvPr/>
+        </p:nvSpPr>
+        <p:spPr>
+          <a:xfrm>
+            <a:off x="6183191" y="5014935"/>
+            <a:ext cx="182880" cy="182880"/>
+          </a:xfrm>
+          <a:prstGeom prst="ellipse">
+            <a:avLst/>
+          </a:prstGeom>
+          <a:solidFill>
+            <a:schemeClr val="bg1"/>
+          </a:solidFill>
+        </p:spPr>
+        <p:style>
+          <a:lnRef idx="2">
+            <a:schemeClr val="accent1">
+              <a:shade val="50000"/>
+            </a:schemeClr>
+          </a:lnRef>
+          <a:fillRef idx="1">
+            <a:schemeClr val="accent1"/>
+          </a:fillRef>
+          <a:effectRef idx="0">
+            <a:schemeClr val="accent1"/>
+          </a:effectRef>
+          <a:fontRef idx="minor">
+            <a:schemeClr val="lt1"/>
+          </a:fontRef>
+        </p:style>
+        <p:txBody>
+          <a:bodyPr rtlCol="0" anchor="ctr"/>
+          <a:lstStyle/>
+          <a:p>
+            <a:pPr algn="ctr"/>
+            <a:endParaRPr lang="en-US"/>
+          </a:p>
+        </p:txBody>
+      </p:sp>
+      <p:sp>
+        <p:nvSpPr>
+          <p:cNvPr id="25" name="Flowchart: Summing Junction 24"/>
+          <p:cNvSpPr/>
+          <p:nvPr/>
+        </p:nvSpPr>
+        <p:spPr>
+          <a:xfrm>
+            <a:off x="4740040" y="5704942"/>
+            <a:ext cx="137160" cy="137160"/>
+          </a:xfrm>
+          <a:prstGeom prst="flowChartSummingJunction">
+            <a:avLst/>
+          </a:prstGeom>
+          <a:solidFill>
+            <a:schemeClr val="bg1"/>
+          </a:solidFill>
+          <a:ln w="12700"/>
+        </p:spPr>
+        <p:style>
+          <a:lnRef idx="2">
+            <a:schemeClr val="accent1">
+              <a:shade val="50000"/>
+            </a:schemeClr>
+          </a:lnRef>
+          <a:fillRef idx="1">
+            <a:schemeClr val="accent1"/>
+          </a:fillRef>
+          <a:effectRef idx="0">
+            <a:schemeClr val="accent1"/>
+          </a:effectRef>
+          <a:fontRef idx="minor">
+            <a:schemeClr val="lt1"/>
+          </a:fontRef>
+        </p:style>
+        <p:txBody>
+          <a:bodyPr rtlCol="0" anchor="ctr"/>
+          <a:lstStyle/>
+          <a:p>
+            <a:pPr algn="ctr"/>
+            <a:endParaRPr lang="en-US"/>
+          </a:p>
+        </p:txBody>
+      </p:sp>
     </p:spTree>
     <p:extLst>
       <p:ext uri="{BB962C8B-B14F-4D97-AF65-F5344CB8AC3E}">

</xml_diff>

<commit_message>
yo yo yo Dina you should finish this shit
</commit_message>
<xml_diff>
--- a/Picture1ab.pptx
+++ b/Picture1ab.pptx
@@ -6083,6 +6083,459 @@
           </a:p>
         </p:txBody>
       </p:sp>
+      <mc:AlternateContent xmlns:mc="http://schemas.openxmlformats.org/markup-compatibility/2006">
+        <mc:Choice xmlns:a14="http://schemas.microsoft.com/office/drawing/2010/main" Requires="a14">
+          <p:sp>
+            <p:nvSpPr>
+              <p:cNvPr id="26" name="TextBox 25"/>
+              <p:cNvSpPr txBox="1"/>
+              <p:nvPr/>
+            </p:nvSpPr>
+            <p:spPr>
+              <a:xfrm>
+                <a:off x="4529996" y="5314593"/>
+                <a:ext cx="205486" cy="286447"/>
+              </a:xfrm>
+              <a:prstGeom prst="rect">
+                <a:avLst/>
+              </a:prstGeom>
+              <a:noFill/>
+            </p:spPr>
+            <p:txBody>
+              <a:bodyPr wrap="square" rtlCol="0">
+                <a:spAutoFit/>
+              </a:bodyPr>
+              <a:lstStyle/>
+              <a:p>
+                <a14:m>
+                  <m:oMathPara xmlns:m="http://schemas.openxmlformats.org/officeDocument/2006/math">
+                    <m:oMathParaPr>
+                      <m:jc m:val="centerGroup"/>
+                    </m:oMathParaPr>
+                    <m:oMath xmlns:m="http://schemas.openxmlformats.org/officeDocument/2006/math">
+                      <m:sSub>
+                        <m:sSubPr>
+                          <m:ctrlPr>
+                            <a:rPr lang="en-US" sz="1200" i="1" smtClean="0">
+                              <a:latin typeface="Cambria Math" panose="02040503050406030204" pitchFamily="18" charset="0"/>
+                            </a:rPr>
+                          </m:ctrlPr>
+                        </m:sSubPr>
+                        <m:e>
+                          <m:r>
+                            <a:rPr lang="en-US" sz="1200" b="0" i="1" smtClean="0">
+                              <a:latin typeface="Cambria Math" panose="02040503050406030204" pitchFamily="18" charset="0"/>
+                            </a:rPr>
+                            <m:t>𝑒</m:t>
+                          </m:r>
+                        </m:e>
+                        <m:sub>
+                          <m:r>
+                            <a:rPr lang="en-US" sz="1200" b="0" i="1" smtClean="0">
+                              <a:latin typeface="Cambria Math" panose="02040503050406030204" pitchFamily="18" charset="0"/>
+                            </a:rPr>
+                            <m:t>𝑧</m:t>
+                          </m:r>
+                        </m:sub>
+                      </m:sSub>
+                    </m:oMath>
+                  </m:oMathPara>
+                </a14:m>
+                <a:endParaRPr lang="en-US" sz="1200" dirty="0">
+                  <a:solidFill>
+                    <a:schemeClr val="tx1"/>
+                  </a:solidFill>
+                  <a:latin typeface="cmbx12" panose="020B0500000000000000" pitchFamily="34" charset="0"/>
+                </a:endParaRPr>
+              </a:p>
+            </p:txBody>
+          </p:sp>
+        </mc:Choice>
+        <mc:Fallback>
+          <p:sp>
+            <p:nvSpPr>
+              <p:cNvPr id="26" name="TextBox 25"/>
+              <p:cNvSpPr txBox="1">
+                <a:spLocks noRot="1" noChangeAspect="1" noMove="1" noResize="1" noEditPoints="1" noAdjustHandles="1" noChangeArrowheads="1" noChangeShapeType="1" noTextEdit="1"/>
+              </p:cNvSpPr>
+              <p:nvPr/>
+            </p:nvSpPr>
+            <p:spPr>
+              <a:xfrm>
+                <a:off x="4529996" y="5314593"/>
+                <a:ext cx="205486" cy="286447"/>
+              </a:xfrm>
+              <a:prstGeom prst="rect">
+                <a:avLst/>
+              </a:prstGeom>
+              <a:blipFill rotWithShape="0">
+                <a:blip r:embed="rId2"/>
+                <a:stretch>
+                  <a:fillRect r="-20588"/>
+                </a:stretch>
+              </a:blipFill>
+            </p:spPr>
+            <p:txBody>
+              <a:bodyPr/>
+              <a:lstStyle/>
+              <a:p>
+                <a:r>
+                  <a:rPr lang="en-US">
+                    <a:noFill/>
+                  </a:rPr>
+                  <a:t> </a:t>
+                </a:r>
+              </a:p>
+            </p:txBody>
+          </p:sp>
+        </mc:Fallback>
+      </mc:AlternateContent>
+      <mc:AlternateContent xmlns:mc="http://schemas.openxmlformats.org/markup-compatibility/2006">
+        <mc:Choice xmlns:a14="http://schemas.microsoft.com/office/drawing/2010/main" Requires="a14">
+          <p:sp>
+            <p:nvSpPr>
+              <p:cNvPr id="27" name="TextBox 26"/>
+              <p:cNvSpPr txBox="1"/>
+              <p:nvPr/>
+            </p:nvSpPr>
+            <p:spPr>
+              <a:xfrm>
+                <a:off x="4942936" y="5520741"/>
+                <a:ext cx="205486" cy="276999"/>
+              </a:xfrm>
+              <a:prstGeom prst="rect">
+                <a:avLst/>
+              </a:prstGeom>
+              <a:noFill/>
+            </p:spPr>
+            <p:txBody>
+              <a:bodyPr wrap="square" rtlCol="0">
+                <a:spAutoFit/>
+              </a:bodyPr>
+              <a:lstStyle/>
+              <a:p>
+                <a14:m>
+                  <m:oMathPara xmlns:m="http://schemas.openxmlformats.org/officeDocument/2006/math">
+                    <m:oMathParaPr>
+                      <m:jc m:val="centerGroup"/>
+                    </m:oMathParaPr>
+                    <m:oMath xmlns:m="http://schemas.openxmlformats.org/officeDocument/2006/math">
+                      <m:sSub>
+                        <m:sSubPr>
+                          <m:ctrlPr>
+                            <a:rPr lang="en-US" sz="1200" i="1" smtClean="0">
+                              <a:latin typeface="Cambria Math" panose="02040503050406030204" pitchFamily="18" charset="0"/>
+                            </a:rPr>
+                          </m:ctrlPr>
+                        </m:sSubPr>
+                        <m:e>
+                          <m:r>
+                            <a:rPr lang="en-US" sz="1200" b="0" i="1" smtClean="0">
+                              <a:latin typeface="Cambria Math" panose="02040503050406030204" pitchFamily="18" charset="0"/>
+                            </a:rPr>
+                            <m:t>𝑒</m:t>
+                          </m:r>
+                        </m:e>
+                        <m:sub>
+                          <m:r>
+                            <a:rPr lang="en-US" sz="1200" b="0" i="1" smtClean="0">
+                              <a:latin typeface="Cambria Math" panose="02040503050406030204" pitchFamily="18" charset="0"/>
+                            </a:rPr>
+                            <m:t>𝑥</m:t>
+                          </m:r>
+                        </m:sub>
+                      </m:sSub>
+                    </m:oMath>
+                  </m:oMathPara>
+                </a14:m>
+                <a:endParaRPr lang="en-US" sz="1200" dirty="0">
+                  <a:solidFill>
+                    <a:schemeClr val="tx1"/>
+                  </a:solidFill>
+                  <a:latin typeface="cmbx12" panose="020B0500000000000000" pitchFamily="34" charset="0"/>
+                </a:endParaRPr>
+              </a:p>
+            </p:txBody>
+          </p:sp>
+        </mc:Choice>
+        <mc:Fallback>
+          <p:sp>
+            <p:nvSpPr>
+              <p:cNvPr id="27" name="TextBox 26"/>
+              <p:cNvSpPr txBox="1">
+                <a:spLocks noRot="1" noChangeAspect="1" noMove="1" noResize="1" noEditPoints="1" noAdjustHandles="1" noChangeArrowheads="1" noChangeShapeType="1" noTextEdit="1"/>
+              </p:cNvSpPr>
+              <p:nvPr/>
+            </p:nvSpPr>
+            <p:spPr>
+              <a:xfrm>
+                <a:off x="4942936" y="5520741"/>
+                <a:ext cx="205486" cy="276999"/>
+              </a:xfrm>
+              <a:prstGeom prst="rect">
+                <a:avLst/>
+              </a:prstGeom>
+              <a:blipFill rotWithShape="0">
+                <a:blip r:embed="rId3"/>
+                <a:stretch>
+                  <a:fillRect r="-23529"/>
+                </a:stretch>
+              </a:blipFill>
+            </p:spPr>
+            <p:txBody>
+              <a:bodyPr/>
+              <a:lstStyle/>
+              <a:p>
+                <a:r>
+                  <a:rPr lang="en-US">
+                    <a:noFill/>
+                  </a:rPr>
+                  <a:t> </a:t>
+                </a:r>
+              </a:p>
+            </p:txBody>
+          </p:sp>
+        </mc:Fallback>
+      </mc:AlternateContent>
+      <mc:AlternateContent xmlns:mc="http://schemas.openxmlformats.org/markup-compatibility/2006">
+        <mc:Choice xmlns:a14="http://schemas.microsoft.com/office/drawing/2010/main" Requires="a14">
+          <p:sp>
+            <p:nvSpPr>
+              <p:cNvPr id="28" name="TextBox 27"/>
+              <p:cNvSpPr txBox="1"/>
+              <p:nvPr/>
+            </p:nvSpPr>
+            <p:spPr>
+              <a:xfrm>
+                <a:off x="4545099" y="5722705"/>
+                <a:ext cx="205486" cy="291618"/>
+              </a:xfrm>
+              <a:prstGeom prst="rect">
+                <a:avLst/>
+              </a:prstGeom>
+              <a:noFill/>
+            </p:spPr>
+            <p:txBody>
+              <a:bodyPr wrap="square" rtlCol="0">
+                <a:spAutoFit/>
+              </a:bodyPr>
+              <a:lstStyle/>
+              <a:p>
+                <a14:m>
+                  <m:oMathPara xmlns:m="http://schemas.openxmlformats.org/officeDocument/2006/math">
+                    <m:oMathParaPr>
+                      <m:jc m:val="centerGroup"/>
+                    </m:oMathParaPr>
+                    <m:oMath xmlns:m="http://schemas.openxmlformats.org/officeDocument/2006/math">
+                      <m:sSub>
+                        <m:sSubPr>
+                          <m:ctrlPr>
+                            <a:rPr lang="en-US" sz="1200" i="1" smtClean="0">
+                              <a:latin typeface="Cambria Math" panose="02040503050406030204" pitchFamily="18" charset="0"/>
+                            </a:rPr>
+                          </m:ctrlPr>
+                        </m:sSubPr>
+                        <m:e>
+                          <m:r>
+                            <a:rPr lang="en-US" sz="1200" b="0" i="1" smtClean="0">
+                              <a:latin typeface="Cambria Math" panose="02040503050406030204" pitchFamily="18" charset="0"/>
+                            </a:rPr>
+                            <m:t>𝑒</m:t>
+                          </m:r>
+                        </m:e>
+                        <m:sub>
+                          <m:r>
+                            <a:rPr lang="en-US" sz="1200" b="0" i="1" smtClean="0">
+                              <a:latin typeface="Cambria Math" panose="02040503050406030204" pitchFamily="18" charset="0"/>
+                            </a:rPr>
+                            <m:t>𝑦</m:t>
+                          </m:r>
+                        </m:sub>
+                      </m:sSub>
+                    </m:oMath>
+                  </m:oMathPara>
+                </a14:m>
+                <a:endParaRPr lang="en-US" sz="1200" dirty="0">
+                  <a:solidFill>
+                    <a:schemeClr val="tx1"/>
+                  </a:solidFill>
+                  <a:latin typeface="cmbx12" panose="020B0500000000000000" pitchFamily="34" charset="0"/>
+                </a:endParaRPr>
+              </a:p>
+            </p:txBody>
+          </p:sp>
+        </mc:Choice>
+        <mc:Fallback>
+          <p:sp>
+            <p:nvSpPr>
+              <p:cNvPr id="28" name="TextBox 27"/>
+              <p:cNvSpPr txBox="1">
+                <a:spLocks noRot="1" noChangeAspect="1" noMove="1" noResize="1" noEditPoints="1" noAdjustHandles="1" noChangeArrowheads="1" noChangeShapeType="1" noTextEdit="1"/>
+              </p:cNvSpPr>
+              <p:nvPr/>
+            </p:nvSpPr>
+            <p:spPr>
+              <a:xfrm>
+                <a:off x="4545099" y="5722705"/>
+                <a:ext cx="205486" cy="291618"/>
+              </a:xfrm>
+              <a:prstGeom prst="rect">
+                <a:avLst/>
+              </a:prstGeom>
+              <a:blipFill rotWithShape="0">
+                <a:blip r:embed="rId4"/>
+                <a:stretch>
+                  <a:fillRect r="-33333"/>
+                </a:stretch>
+              </a:blipFill>
+            </p:spPr>
+            <p:txBody>
+              <a:bodyPr/>
+              <a:lstStyle/>
+              <a:p>
+                <a:r>
+                  <a:rPr lang="en-US">
+                    <a:noFill/>
+                  </a:rPr>
+                  <a:t> </a:t>
+                </a:r>
+              </a:p>
+            </p:txBody>
+          </p:sp>
+        </mc:Fallback>
+      </mc:AlternateContent>
+      <p:sp>
+        <p:nvSpPr>
+          <p:cNvPr id="29" name="Flowchart: Summing Junction 28"/>
+          <p:cNvSpPr/>
+          <p:nvPr/>
+        </p:nvSpPr>
+        <p:spPr>
+          <a:xfrm>
+            <a:off x="1837575" y="5680639"/>
+            <a:ext cx="137160" cy="137160"/>
+          </a:xfrm>
+          <a:prstGeom prst="flowChartSummingJunction">
+            <a:avLst/>
+          </a:prstGeom>
+          <a:solidFill>
+            <a:schemeClr val="bg1"/>
+          </a:solidFill>
+          <a:ln w="12700"/>
+        </p:spPr>
+        <p:style>
+          <a:lnRef idx="2">
+            <a:schemeClr val="accent1">
+              <a:shade val="50000"/>
+            </a:schemeClr>
+          </a:lnRef>
+          <a:fillRef idx="1">
+            <a:schemeClr val="accent1"/>
+          </a:fillRef>
+          <a:effectRef idx="0">
+            <a:schemeClr val="accent1"/>
+          </a:effectRef>
+          <a:fontRef idx="minor">
+            <a:schemeClr val="lt1"/>
+          </a:fontRef>
+        </p:style>
+        <p:txBody>
+          <a:bodyPr rtlCol="0" anchor="ctr"/>
+          <a:lstStyle/>
+          <a:p>
+            <a:pPr algn="ctr"/>
+            <a:endParaRPr lang="en-US"/>
+          </a:p>
+        </p:txBody>
+      </p:sp>
+      <mc:AlternateContent xmlns:mc="http://schemas.openxmlformats.org/markup-compatibility/2006">
+        <mc:Choice xmlns:a14="http://schemas.microsoft.com/office/drawing/2010/main" Requires="a14">
+          <p:sp>
+            <p:nvSpPr>
+              <p:cNvPr id="30" name="TextBox 29"/>
+              <p:cNvSpPr txBox="1"/>
+              <p:nvPr/>
+            </p:nvSpPr>
+            <p:spPr>
+              <a:xfrm>
+                <a:off x="1933181" y="5633137"/>
+                <a:ext cx="205486" cy="276999"/>
+              </a:xfrm>
+              <a:prstGeom prst="rect">
+                <a:avLst/>
+              </a:prstGeom>
+              <a:noFill/>
+            </p:spPr>
+            <p:txBody>
+              <a:bodyPr wrap="square" rtlCol="0">
+                <a:spAutoFit/>
+              </a:bodyPr>
+              <a:lstStyle/>
+              <a:p>
+                <a14:m>
+                  <m:oMathPara xmlns:m="http://schemas.openxmlformats.org/officeDocument/2006/math">
+                    <m:oMathParaPr>
+                      <m:jc m:val="centerGroup"/>
+                    </m:oMathParaPr>
+                    <m:oMath xmlns:m="http://schemas.openxmlformats.org/officeDocument/2006/math">
+                      <m:r>
+                        <a:rPr lang="en-US" sz="1200" i="1" smtClean="0">
+                          <a:latin typeface="Cambria Math" panose="02040503050406030204" pitchFamily="18" charset="0"/>
+                        </a:rPr>
+                        <m:t>𝐵</m:t>
+                      </m:r>
+                    </m:oMath>
+                  </m:oMathPara>
+                </a14:m>
+                <a:endParaRPr lang="en-US" sz="1200" dirty="0">
+                  <a:solidFill>
+                    <a:schemeClr val="tx1"/>
+                  </a:solidFill>
+                  <a:latin typeface="cmbx12" panose="020B0500000000000000" pitchFamily="34" charset="0"/>
+                </a:endParaRPr>
+              </a:p>
+            </p:txBody>
+          </p:sp>
+        </mc:Choice>
+        <mc:Fallback>
+          <p:sp>
+            <p:nvSpPr>
+              <p:cNvPr id="30" name="TextBox 29"/>
+              <p:cNvSpPr txBox="1">
+                <a:spLocks noRot="1" noChangeAspect="1" noMove="1" noResize="1" noEditPoints="1" noAdjustHandles="1" noChangeArrowheads="1" noChangeShapeType="1" noTextEdit="1"/>
+              </p:cNvSpPr>
+              <p:nvPr/>
+            </p:nvSpPr>
+            <p:spPr>
+              <a:xfrm>
+                <a:off x="1933181" y="5633137"/>
+                <a:ext cx="205486" cy="276999"/>
+              </a:xfrm>
+              <a:prstGeom prst="rect">
+                <a:avLst/>
+              </a:prstGeom>
+              <a:blipFill rotWithShape="0">
+                <a:blip r:embed="rId5"/>
+                <a:stretch>
+                  <a:fillRect r="-17647"/>
+                </a:stretch>
+              </a:blipFill>
+            </p:spPr>
+            <p:txBody>
+              <a:bodyPr/>
+              <a:lstStyle/>
+              <a:p>
+                <a:r>
+                  <a:rPr lang="en-US">
+                    <a:noFill/>
+                  </a:rPr>
+                  <a:t> </a:t>
+                </a:r>
+              </a:p>
+            </p:txBody>
+          </p:sp>
+        </mc:Fallback>
+      </mc:AlternateContent>
     </p:spTree>
     <p:extLst>
       <p:ext uri="{BB962C8B-B14F-4D97-AF65-F5344CB8AC3E}">

</xml_diff>

<commit_message>
Another round of Ian's comments - in progress
</commit_message>
<xml_diff>
--- a/Picture1ab.pptx
+++ b/Picture1ab.pptx
@@ -244,7 +244,7 @@
           <a:p>
             <a:fld id="{D61CA99B-1A52-41E4-BE43-6641B2C1149F}" type="datetimeFigureOut">
               <a:rPr lang="en-US" smtClean="0"/>
-              <a:t>5/7/2015</a:t>
+              <a:t>6/22/2015</a:t>
             </a:fld>
             <a:endParaRPr lang="en-US"/>
           </a:p>
@@ -414,7 +414,7 @@
           <a:p>
             <a:fld id="{D61CA99B-1A52-41E4-BE43-6641B2C1149F}" type="datetimeFigureOut">
               <a:rPr lang="en-US" smtClean="0"/>
-              <a:t>5/7/2015</a:t>
+              <a:t>6/22/2015</a:t>
             </a:fld>
             <a:endParaRPr lang="en-US"/>
           </a:p>
@@ -594,7 +594,7 @@
           <a:p>
             <a:fld id="{D61CA99B-1A52-41E4-BE43-6641B2C1149F}" type="datetimeFigureOut">
               <a:rPr lang="en-US" smtClean="0"/>
-              <a:t>5/7/2015</a:t>
+              <a:t>6/22/2015</a:t>
             </a:fld>
             <a:endParaRPr lang="en-US"/>
           </a:p>
@@ -764,7 +764,7 @@
           <a:p>
             <a:fld id="{D61CA99B-1A52-41E4-BE43-6641B2C1149F}" type="datetimeFigureOut">
               <a:rPr lang="en-US" smtClean="0"/>
-              <a:t>5/7/2015</a:t>
+              <a:t>6/22/2015</a:t>
             </a:fld>
             <a:endParaRPr lang="en-US"/>
           </a:p>
@@ -1010,7 +1010,7 @@
           <a:p>
             <a:fld id="{D61CA99B-1A52-41E4-BE43-6641B2C1149F}" type="datetimeFigureOut">
               <a:rPr lang="en-US" smtClean="0"/>
-              <a:t>5/7/2015</a:t>
+              <a:t>6/22/2015</a:t>
             </a:fld>
             <a:endParaRPr lang="en-US"/>
           </a:p>
@@ -1242,7 +1242,7 @@
           <a:p>
             <a:fld id="{D61CA99B-1A52-41E4-BE43-6641B2C1149F}" type="datetimeFigureOut">
               <a:rPr lang="en-US" smtClean="0"/>
-              <a:t>5/7/2015</a:t>
+              <a:t>6/22/2015</a:t>
             </a:fld>
             <a:endParaRPr lang="en-US"/>
           </a:p>
@@ -1609,7 +1609,7 @@
           <a:p>
             <a:fld id="{D61CA99B-1A52-41E4-BE43-6641B2C1149F}" type="datetimeFigureOut">
               <a:rPr lang="en-US" smtClean="0"/>
-              <a:t>5/7/2015</a:t>
+              <a:t>6/22/2015</a:t>
             </a:fld>
             <a:endParaRPr lang="en-US"/>
           </a:p>
@@ -1727,7 +1727,7 @@
           <a:p>
             <a:fld id="{D61CA99B-1A52-41E4-BE43-6641B2C1149F}" type="datetimeFigureOut">
               <a:rPr lang="en-US" smtClean="0"/>
-              <a:t>5/7/2015</a:t>
+              <a:t>6/22/2015</a:t>
             </a:fld>
             <a:endParaRPr lang="en-US"/>
           </a:p>
@@ -1822,7 +1822,7 @@
           <a:p>
             <a:fld id="{D61CA99B-1A52-41E4-BE43-6641B2C1149F}" type="datetimeFigureOut">
               <a:rPr lang="en-US" smtClean="0"/>
-              <a:t>5/7/2015</a:t>
+              <a:t>6/22/2015</a:t>
             </a:fld>
             <a:endParaRPr lang="en-US"/>
           </a:p>
@@ -2099,7 +2099,7 @@
           <a:p>
             <a:fld id="{D61CA99B-1A52-41E4-BE43-6641B2C1149F}" type="datetimeFigureOut">
               <a:rPr lang="en-US" smtClean="0"/>
-              <a:t>5/7/2015</a:t>
+              <a:t>6/22/2015</a:t>
             </a:fld>
             <a:endParaRPr lang="en-US"/>
           </a:p>
@@ -2352,7 +2352,7 @@
           <a:p>
             <a:fld id="{D61CA99B-1A52-41E4-BE43-6641B2C1149F}" type="datetimeFigureOut">
               <a:rPr lang="en-US" smtClean="0"/>
-              <a:t>5/7/2015</a:t>
+              <a:t>6/22/2015</a:t>
             </a:fld>
             <a:endParaRPr lang="en-US"/>
           </a:p>
@@ -2565,7 +2565,7 @@
           <a:p>
             <a:fld id="{D61CA99B-1A52-41E4-BE43-6641B2C1149F}" type="datetimeFigureOut">
               <a:rPr lang="en-US" smtClean="0"/>
-              <a:t>5/7/2015</a:t>
+              <a:t>6/22/2015</a:t>
             </a:fld>
             <a:endParaRPr lang="en-US"/>
           </a:p>
@@ -3154,6 +3154,11 @@
             </a:path>
             <a:tileRect/>
           </a:gradFill>
+          <a:ln>
+            <a:solidFill>
+              <a:schemeClr val="tx1"/>
+            </a:solidFill>
+          </a:ln>
           <a:scene3d>
             <a:camera prst="isometricLeftDown"/>
             <a:lightRig rig="threePt" dir="t"/>
@@ -3203,15 +3208,16 @@
           </a:prstGeom>
           <a:gradFill flip="none" rotWithShape="1">
             <a:gsLst>
-              <a:gs pos="100000">
-                <a:schemeClr val="accent1"/>
+              <a:gs pos="88000">
+                <a:schemeClr val="accent1">
+                  <a:lumMod val="40000"/>
+                  <a:lumOff val="60000"/>
+                </a:schemeClr>
               </a:gs>
               <a:gs pos="0">
-                <a:schemeClr val="accent6">
-                  <a:tint val="55000"/>
-                  <a:satMod val="140000"/>
-                  <a:lumMod val="0"/>
-                  <a:lumOff val="100000"/>
+                <a:schemeClr val="tx1">
+                  <a:lumMod val="65000"/>
+                  <a:lumOff val="35000"/>
                 </a:schemeClr>
               </a:gs>
             </a:gsLst>
@@ -3288,6 +3294,11 @@
             </a:path>
             <a:tileRect/>
           </a:gradFill>
+          <a:ln>
+            <a:solidFill>
+              <a:schemeClr val="tx1"/>
+            </a:solidFill>
+          </a:ln>
           <a:scene3d>
             <a:camera prst="isometricLeftDown"/>
             <a:lightRig rig="threePt" dir="t"/>
@@ -4666,8 +4677,8 @@
           </p:sp>
         </mc:Fallback>
       </mc:AlternateContent>
-      <mc:AlternateContent xmlns:mc="http://schemas.openxmlformats.org/markup-compatibility/2006">
-        <mc:Choice xmlns:a14="http://schemas.microsoft.com/office/drawing/2010/main" Requires="a14">
+      <mc:AlternateContent xmlns:mc="http://schemas.openxmlformats.org/markup-compatibility/2006" xmlns:a14="http://schemas.microsoft.com/office/drawing/2010/main">
+        <mc:Choice Requires="a14">
           <p:sp>
             <p:nvSpPr>
               <p:cNvPr id="77" name="TextBox 76"/>
@@ -4690,6 +4701,7 @@
               </a:bodyPr>
               <a:lstStyle/>
               <a:p>
+                <a:pPr/>
                 <a14:m>
                   <m:oMathPara xmlns:m="http://schemas.openxmlformats.org/officeDocument/2006/math">
                     <m:oMathParaPr>
@@ -4734,7 +4746,7 @@
             </p:txBody>
           </p:sp>
         </mc:Choice>
-        <mc:Fallback>
+        <mc:Fallback xmlns="">
           <p:sp>
             <p:nvSpPr>
               <p:cNvPr id="77" name="TextBox 76"/>
@@ -5107,8 +5119,8 @@
           </a:fontRef>
         </p:style>
       </p:cxnSp>
-      <mc:AlternateContent xmlns:mc="http://schemas.openxmlformats.org/markup-compatibility/2006">
-        <mc:Choice xmlns:a14="http://schemas.microsoft.com/office/drawing/2010/main" Requires="a14">
+      <mc:AlternateContent xmlns:mc="http://schemas.openxmlformats.org/markup-compatibility/2006" xmlns:a14="http://schemas.microsoft.com/office/drawing/2010/main">
+        <mc:Choice Requires="a14">
           <p:sp>
             <p:nvSpPr>
               <p:cNvPr id="45" name="TextBox 44"/>
@@ -5131,6 +5143,7 @@
               </a:bodyPr>
               <a:lstStyle/>
               <a:p>
+                <a:pPr/>
                 <a14:m>
                   <m:oMathPara xmlns:m="http://schemas.openxmlformats.org/officeDocument/2006/math">
                     <m:oMathParaPr>
@@ -5175,7 +5188,7 @@
             </p:txBody>
           </p:sp>
         </mc:Choice>
-        <mc:Fallback>
+        <mc:Fallback xmlns="">
           <p:sp>
             <p:nvSpPr>
               <p:cNvPr id="45" name="TextBox 44"/>
@@ -6083,8 +6096,8 @@
           </a:p>
         </p:txBody>
       </p:sp>
-      <mc:AlternateContent xmlns:mc="http://schemas.openxmlformats.org/markup-compatibility/2006">
-        <mc:Choice xmlns:a14="http://schemas.microsoft.com/office/drawing/2010/main" Requires="a14">
+      <mc:AlternateContent xmlns:mc="http://schemas.openxmlformats.org/markup-compatibility/2006" xmlns:a14="http://schemas.microsoft.com/office/drawing/2010/main">
+        <mc:Choice Requires="a14">
           <p:sp>
             <p:nvSpPr>
               <p:cNvPr id="26" name="TextBox 25"/>
@@ -6107,6 +6120,7 @@
               </a:bodyPr>
               <a:lstStyle/>
               <a:p>
+                <a:pPr/>
                 <a14:m>
                   <m:oMathPara xmlns:m="http://schemas.openxmlformats.org/officeDocument/2006/math">
                     <m:oMathParaPr>
@@ -6151,7 +6165,7 @@
             </p:txBody>
           </p:sp>
         </mc:Choice>
-        <mc:Fallback>
+        <mc:Fallback xmlns="">
           <p:sp>
             <p:nvSpPr>
               <p:cNvPr id="26" name="TextBox 25"/>
@@ -6190,8 +6204,8 @@
           </p:sp>
         </mc:Fallback>
       </mc:AlternateContent>
-      <mc:AlternateContent xmlns:mc="http://schemas.openxmlformats.org/markup-compatibility/2006">
-        <mc:Choice xmlns:a14="http://schemas.microsoft.com/office/drawing/2010/main" Requires="a14">
+      <mc:AlternateContent xmlns:mc="http://schemas.openxmlformats.org/markup-compatibility/2006" xmlns:a14="http://schemas.microsoft.com/office/drawing/2010/main">
+        <mc:Choice Requires="a14">
           <p:sp>
             <p:nvSpPr>
               <p:cNvPr id="27" name="TextBox 26"/>
@@ -6214,6 +6228,7 @@
               </a:bodyPr>
               <a:lstStyle/>
               <a:p>
+                <a:pPr/>
                 <a14:m>
                   <m:oMathPara xmlns:m="http://schemas.openxmlformats.org/officeDocument/2006/math">
                     <m:oMathParaPr>
@@ -6258,7 +6273,7 @@
             </p:txBody>
           </p:sp>
         </mc:Choice>
-        <mc:Fallback>
+        <mc:Fallback xmlns="">
           <p:sp>
             <p:nvSpPr>
               <p:cNvPr id="27" name="TextBox 26"/>
@@ -6297,8 +6312,8 @@
           </p:sp>
         </mc:Fallback>
       </mc:AlternateContent>
-      <mc:AlternateContent xmlns:mc="http://schemas.openxmlformats.org/markup-compatibility/2006">
-        <mc:Choice xmlns:a14="http://schemas.microsoft.com/office/drawing/2010/main" Requires="a14">
+      <mc:AlternateContent xmlns:mc="http://schemas.openxmlformats.org/markup-compatibility/2006" xmlns:a14="http://schemas.microsoft.com/office/drawing/2010/main">
+        <mc:Choice Requires="a14">
           <p:sp>
             <p:nvSpPr>
               <p:cNvPr id="28" name="TextBox 27"/>
@@ -6321,6 +6336,7 @@
               </a:bodyPr>
               <a:lstStyle/>
               <a:p>
+                <a:pPr/>
                 <a14:m>
                   <m:oMathPara xmlns:m="http://schemas.openxmlformats.org/officeDocument/2006/math">
                     <m:oMathParaPr>
@@ -6365,7 +6381,7 @@
             </p:txBody>
           </p:sp>
         </mc:Choice>
-        <mc:Fallback>
+        <mc:Fallback xmlns="">
           <p:sp>
             <p:nvSpPr>
               <p:cNvPr id="28" name="TextBox 27"/>
@@ -6448,8 +6464,8 @@
           </a:p>
         </p:txBody>
       </p:sp>
-      <mc:AlternateContent xmlns:mc="http://schemas.openxmlformats.org/markup-compatibility/2006">
-        <mc:Choice xmlns:a14="http://schemas.microsoft.com/office/drawing/2010/main" Requires="a14">
+      <mc:AlternateContent xmlns:mc="http://schemas.openxmlformats.org/markup-compatibility/2006" xmlns:a14="http://schemas.microsoft.com/office/drawing/2010/main">
+        <mc:Choice Requires="a14">
           <p:sp>
             <p:nvSpPr>
               <p:cNvPr id="30" name="TextBox 29"/>
@@ -6472,6 +6488,7 @@
               </a:bodyPr>
               <a:lstStyle/>
               <a:p>
+                <a:pPr/>
                 <a14:m>
                   <m:oMathPara xmlns:m="http://schemas.openxmlformats.org/officeDocument/2006/math">
                     <m:oMathParaPr>
@@ -6497,7 +6514,7 @@
             </p:txBody>
           </p:sp>
         </mc:Choice>
-        <mc:Fallback>
+        <mc:Fallback xmlns="">
           <p:sp>
             <p:nvSpPr>
               <p:cNvPr id="30" name="TextBox 29"/>

</xml_diff>

<commit_message>
After second round of Lauren and Hsin-I comments, sent to Ian.
</commit_message>
<xml_diff>
--- a/Picture1ab.pptx
+++ b/Picture1ab.pptx
@@ -9,7 +9,7 @@
     <p:sldId id="257" r:id="rId3"/>
   </p:sldIdLst>
   <p:sldSz cx="12192000" cy="6858000"/>
-  <p:notesSz cx="6858000" cy="9144000"/>
+  <p:notesSz cx="7315200" cy="9601200"/>
   <p:defaultTextStyle>
     <a:defPPr>
       <a:defRPr lang="en-US"/>
@@ -244,7 +244,7 @@
           <a:p>
             <a:fld id="{D61CA99B-1A52-41E4-BE43-6641B2C1149F}" type="datetimeFigureOut">
               <a:rPr lang="en-US" smtClean="0"/>
-              <a:t>6/22/2015</a:t>
+              <a:t>8/11/2015</a:t>
             </a:fld>
             <a:endParaRPr lang="en-US"/>
           </a:p>
@@ -414,7 +414,7 @@
           <a:p>
             <a:fld id="{D61CA99B-1A52-41E4-BE43-6641B2C1149F}" type="datetimeFigureOut">
               <a:rPr lang="en-US" smtClean="0"/>
-              <a:t>6/22/2015</a:t>
+              <a:t>8/11/2015</a:t>
             </a:fld>
             <a:endParaRPr lang="en-US"/>
           </a:p>
@@ -594,7 +594,7 @@
           <a:p>
             <a:fld id="{D61CA99B-1A52-41E4-BE43-6641B2C1149F}" type="datetimeFigureOut">
               <a:rPr lang="en-US" smtClean="0"/>
-              <a:t>6/22/2015</a:t>
+              <a:t>8/11/2015</a:t>
             </a:fld>
             <a:endParaRPr lang="en-US"/>
           </a:p>
@@ -764,7 +764,7 @@
           <a:p>
             <a:fld id="{D61CA99B-1A52-41E4-BE43-6641B2C1149F}" type="datetimeFigureOut">
               <a:rPr lang="en-US" smtClean="0"/>
-              <a:t>6/22/2015</a:t>
+              <a:t>8/11/2015</a:t>
             </a:fld>
             <a:endParaRPr lang="en-US"/>
           </a:p>
@@ -1010,7 +1010,7 @@
           <a:p>
             <a:fld id="{D61CA99B-1A52-41E4-BE43-6641B2C1149F}" type="datetimeFigureOut">
               <a:rPr lang="en-US" smtClean="0"/>
-              <a:t>6/22/2015</a:t>
+              <a:t>8/11/2015</a:t>
             </a:fld>
             <a:endParaRPr lang="en-US"/>
           </a:p>
@@ -1242,7 +1242,7 @@
           <a:p>
             <a:fld id="{D61CA99B-1A52-41E4-BE43-6641B2C1149F}" type="datetimeFigureOut">
               <a:rPr lang="en-US" smtClean="0"/>
-              <a:t>6/22/2015</a:t>
+              <a:t>8/11/2015</a:t>
             </a:fld>
             <a:endParaRPr lang="en-US"/>
           </a:p>
@@ -1609,7 +1609,7 @@
           <a:p>
             <a:fld id="{D61CA99B-1A52-41E4-BE43-6641B2C1149F}" type="datetimeFigureOut">
               <a:rPr lang="en-US" smtClean="0"/>
-              <a:t>6/22/2015</a:t>
+              <a:t>8/11/2015</a:t>
             </a:fld>
             <a:endParaRPr lang="en-US"/>
           </a:p>
@@ -1727,7 +1727,7 @@
           <a:p>
             <a:fld id="{D61CA99B-1A52-41E4-BE43-6641B2C1149F}" type="datetimeFigureOut">
               <a:rPr lang="en-US" smtClean="0"/>
-              <a:t>6/22/2015</a:t>
+              <a:t>8/11/2015</a:t>
             </a:fld>
             <a:endParaRPr lang="en-US"/>
           </a:p>
@@ -1822,7 +1822,7 @@
           <a:p>
             <a:fld id="{D61CA99B-1A52-41E4-BE43-6641B2C1149F}" type="datetimeFigureOut">
               <a:rPr lang="en-US" smtClean="0"/>
-              <a:t>6/22/2015</a:t>
+              <a:t>8/11/2015</a:t>
             </a:fld>
             <a:endParaRPr lang="en-US"/>
           </a:p>
@@ -2099,7 +2099,7 @@
           <a:p>
             <a:fld id="{D61CA99B-1A52-41E4-BE43-6641B2C1149F}" type="datetimeFigureOut">
               <a:rPr lang="en-US" smtClean="0"/>
-              <a:t>6/22/2015</a:t>
+              <a:t>8/11/2015</a:t>
             </a:fld>
             <a:endParaRPr lang="en-US"/>
           </a:p>
@@ -2352,7 +2352,7 @@
           <a:p>
             <a:fld id="{D61CA99B-1A52-41E4-BE43-6641B2C1149F}" type="datetimeFigureOut">
               <a:rPr lang="en-US" smtClean="0"/>
-              <a:t>6/22/2015</a:t>
+              <a:t>8/11/2015</a:t>
             </a:fld>
             <a:endParaRPr lang="en-US"/>
           </a:p>
@@ -2565,7 +2565,7 @@
           <a:p>
             <a:fld id="{D61CA99B-1A52-41E4-BE43-6641B2C1149F}" type="datetimeFigureOut">
               <a:rPr lang="en-US" smtClean="0"/>
-              <a:t>6/22/2015</a:t>
+              <a:t>8/11/2015</a:t>
             </a:fld>
             <a:endParaRPr lang="en-US"/>
           </a:p>
@@ -3208,17 +3208,14 @@
           </a:prstGeom>
           <a:gradFill flip="none" rotWithShape="1">
             <a:gsLst>
-              <a:gs pos="88000">
+              <a:gs pos="58000">
                 <a:schemeClr val="accent1">
                   <a:lumMod val="40000"/>
                   <a:lumOff val="60000"/>
                 </a:schemeClr>
               </a:gs>
               <a:gs pos="0">
-                <a:schemeClr val="tx1">
-                  <a:lumMod val="65000"/>
-                  <a:lumOff val="35000"/>
-                </a:schemeClr>
+                <a:schemeClr val="bg1"/>
               </a:gs>
             </a:gsLst>
             <a:path path="circle">
@@ -3374,7 +3371,7 @@
         </p:nvSpPr>
         <p:spPr>
           <a:xfrm>
-            <a:off x="1897252" y="1558236"/>
+            <a:off x="1919700" y="1558236"/>
             <a:ext cx="878355" cy="276999"/>
           </a:xfrm>
           <a:prstGeom prst="rect">
@@ -3400,8 +3397,8 @@
           </a:p>
         </p:txBody>
       </p:sp>
-      <mc:AlternateContent xmlns:mc="http://schemas.openxmlformats.org/markup-compatibility/2006" xmlns:a14="http://schemas.microsoft.com/office/drawing/2010/main">
-        <mc:Choice Requires="a14">
+      <mc:AlternateContent xmlns:mc="http://schemas.openxmlformats.org/markup-compatibility/2006">
+        <mc:Choice xmlns:a14="http://schemas.microsoft.com/office/drawing/2010/main" Requires="a14">
           <p:sp>
             <p:nvSpPr>
               <p:cNvPr id="20" name="TextBox 19"/>
@@ -3410,8 +3407,8 @@
             </p:nvSpPr>
             <p:spPr>
               <a:xfrm>
-                <a:off x="1633913" y="1922366"/>
-                <a:ext cx="1482512" cy="291811"/>
+                <a:off x="1468332" y="1913457"/>
+                <a:ext cx="1781091" cy="291811"/>
               </a:xfrm>
               <a:prstGeom prst="rect">
                 <a:avLst/>
@@ -3469,6 +3466,51 @@
                         </m:r>
                       </m:sub>
                     </m:sSub>
+                    <m:r>
+                      <a:rPr lang="en-US" sz="1200" b="0" i="1" smtClean="0">
+                        <a:solidFill>
+                          <a:schemeClr val="tx1"/>
+                        </a:solidFill>
+                        <a:latin typeface="Cambria Math" panose="02040503050406030204" pitchFamily="18" charset="0"/>
+                      </a:rPr>
+                      <m:t>(</m:t>
+                    </m:r>
+                    <m:r>
+                      <a:rPr lang="en-US" sz="1200" b="0" i="1" smtClean="0">
+                        <a:solidFill>
+                          <a:schemeClr val="tx1"/>
+                        </a:solidFill>
+                        <a:latin typeface="Cambria Math" panose="02040503050406030204" pitchFamily="18" charset="0"/>
+                      </a:rPr>
+                      <m:t>𝑥</m:t>
+                    </m:r>
+                    <m:r>
+                      <a:rPr lang="en-US" sz="1200" b="0" i="1" smtClean="0">
+                        <a:solidFill>
+                          <a:schemeClr val="tx1"/>
+                        </a:solidFill>
+                        <a:latin typeface="Cambria Math" panose="02040503050406030204" pitchFamily="18" charset="0"/>
+                      </a:rPr>
+                      <m:t>,</m:t>
+                    </m:r>
+                    <m:r>
+                      <a:rPr lang="en-US" sz="1200" b="0" i="1" smtClean="0">
+                        <a:solidFill>
+                          <a:schemeClr val="tx1"/>
+                        </a:solidFill>
+                        <a:latin typeface="Cambria Math" panose="02040503050406030204" pitchFamily="18" charset="0"/>
+                      </a:rPr>
+                      <m:t>𝑦</m:t>
+                    </m:r>
+                    <m:r>
+                      <a:rPr lang="en-US" sz="1200" b="0" i="1" smtClean="0">
+                        <a:solidFill>
+                          <a:schemeClr val="tx1"/>
+                        </a:solidFill>
+                        <a:latin typeface="Cambria Math" panose="02040503050406030204" pitchFamily="18" charset="0"/>
+                      </a:rPr>
+                      <m:t>)</m:t>
+                    </m:r>
                   </m:oMath>
                 </a14:m>
                 <a:r>
@@ -3490,7 +3532,7 @@
             </p:txBody>
           </p:sp>
         </mc:Choice>
-        <mc:Fallback xmlns="">
+        <mc:Fallback>
           <p:sp>
             <p:nvSpPr>
               <p:cNvPr id="20" name="TextBox 19"/>
@@ -3501,8 +3543,8 @@
             </p:nvSpPr>
             <p:spPr>
               <a:xfrm>
-                <a:off x="1633913" y="1922366"/>
-                <a:ext cx="1482512" cy="291811"/>
+                <a:off x="1468332" y="1913457"/>
+                <a:ext cx="1781091" cy="291811"/>
               </a:xfrm>
               <a:prstGeom prst="rect">
                 <a:avLst/>
@@ -3510,7 +3552,7 @@
               <a:blipFill rotWithShape="0">
                 <a:blip r:embed="rId2"/>
                 <a:stretch>
-                  <a:fillRect b="-12500"/>
+                  <a:fillRect l="-342" b="-12500"/>
                 </a:stretch>
               </a:blipFill>
             </p:spPr>
@@ -3529,8 +3571,8 @@
           </p:sp>
         </mc:Fallback>
       </mc:AlternateContent>
-      <mc:AlternateContent xmlns:mc="http://schemas.openxmlformats.org/markup-compatibility/2006" xmlns:a14="http://schemas.microsoft.com/office/drawing/2010/main">
-        <mc:Choice Requires="a14">
+      <mc:AlternateContent xmlns:mc="http://schemas.openxmlformats.org/markup-compatibility/2006">
+        <mc:Choice xmlns:a14="http://schemas.microsoft.com/office/drawing/2010/main" Requires="a14">
           <p:sp>
             <p:nvSpPr>
               <p:cNvPr id="21" name="TextBox 20"/>
@@ -3539,8 +3581,8 @@
             </p:nvSpPr>
             <p:spPr>
               <a:xfrm>
-                <a:off x="1666857" y="3871896"/>
-                <a:ext cx="1449568" cy="276999"/>
+                <a:off x="1413977" y="3871896"/>
+                <a:ext cx="1889801" cy="276999"/>
               </a:xfrm>
               <a:prstGeom prst="rect">
                 <a:avLst/>
@@ -3598,6 +3640,51 @@
                         </m:r>
                       </m:sub>
                     </m:sSub>
+                    <m:r>
+                      <a:rPr lang="en-US" sz="1200" b="0" i="1" smtClean="0">
+                        <a:solidFill>
+                          <a:schemeClr val="tx1"/>
+                        </a:solidFill>
+                        <a:latin typeface="Cambria Math" panose="02040503050406030204" pitchFamily="18" charset="0"/>
+                      </a:rPr>
+                      <m:t>(</m:t>
+                    </m:r>
+                    <m:r>
+                      <a:rPr lang="en-US" sz="1200" b="0" i="1" smtClean="0">
+                        <a:solidFill>
+                          <a:schemeClr val="tx1"/>
+                        </a:solidFill>
+                        <a:latin typeface="Cambria Math" panose="02040503050406030204" pitchFamily="18" charset="0"/>
+                      </a:rPr>
+                      <m:t>𝑥</m:t>
+                    </m:r>
+                    <m:r>
+                      <a:rPr lang="en-US" sz="1200" b="0" i="1" smtClean="0">
+                        <a:solidFill>
+                          <a:schemeClr val="tx1"/>
+                        </a:solidFill>
+                        <a:latin typeface="Cambria Math" panose="02040503050406030204" pitchFamily="18" charset="0"/>
+                      </a:rPr>
+                      <m:t>,</m:t>
+                    </m:r>
+                    <m:r>
+                      <a:rPr lang="en-US" sz="1200" b="0" i="1" smtClean="0">
+                        <a:solidFill>
+                          <a:schemeClr val="tx1"/>
+                        </a:solidFill>
+                        <a:latin typeface="Cambria Math" panose="02040503050406030204" pitchFamily="18" charset="0"/>
+                      </a:rPr>
+                      <m:t>𝑦</m:t>
+                    </m:r>
+                    <m:r>
+                      <a:rPr lang="en-US" sz="1200" b="0" i="1" smtClean="0">
+                        <a:solidFill>
+                          <a:schemeClr val="tx1"/>
+                        </a:solidFill>
+                        <a:latin typeface="Cambria Math" panose="02040503050406030204" pitchFamily="18" charset="0"/>
+                      </a:rPr>
+                      <m:t>)</m:t>
+                    </m:r>
                   </m:oMath>
                 </a14:m>
                 <a:r>
@@ -3619,7 +3706,7 @@
             </p:txBody>
           </p:sp>
         </mc:Choice>
-        <mc:Fallback xmlns="">
+        <mc:Fallback>
           <p:sp>
             <p:nvSpPr>
               <p:cNvPr id="21" name="TextBox 20"/>
@@ -3630,8 +3717,8 @@
             </p:nvSpPr>
             <p:spPr>
               <a:xfrm>
-                <a:off x="1666857" y="3871896"/>
-                <a:ext cx="1449568" cy="276999"/>
+                <a:off x="1413977" y="3871896"/>
+                <a:ext cx="1889801" cy="276999"/>
               </a:xfrm>
               <a:prstGeom prst="rect">
                 <a:avLst/>
@@ -3639,7 +3726,7 @@
               <a:blipFill rotWithShape="0">
                 <a:blip r:embed="rId3"/>
                 <a:stretch>
-                  <a:fillRect b="-15217"/>
+                  <a:fillRect l="-323" b="-15217"/>
                 </a:stretch>
               </a:blipFill>
             </p:spPr>
@@ -5227,6 +5314,444 @@
           </p:sp>
         </mc:Fallback>
       </mc:AlternateContent>
+      <p:grpSp>
+        <p:nvGrpSpPr>
+          <p:cNvPr id="10" name="Group 9"/>
+          <p:cNvGrpSpPr/>
+          <p:nvPr/>
+        </p:nvGrpSpPr>
+        <p:grpSpPr>
+          <a:xfrm>
+            <a:off x="836142" y="250134"/>
+            <a:ext cx="466410" cy="745311"/>
+            <a:chOff x="836142" y="221559"/>
+            <a:chExt cx="466410" cy="745311"/>
+          </a:xfrm>
+        </p:grpSpPr>
+        <p:cxnSp>
+          <p:nvCxnSpPr>
+            <p:cNvPr id="46" name="Straight Arrow Connector 45"/>
+            <p:cNvCxnSpPr/>
+            <p:nvPr/>
+          </p:nvCxnSpPr>
+          <p:spPr>
+            <a:xfrm rot="18060000">
+              <a:off x="1075397" y="439820"/>
+              <a:ext cx="0" cy="411480"/>
+            </a:xfrm>
+            <a:prstGeom prst="straightConnector1">
+              <a:avLst/>
+            </a:prstGeom>
+            <a:ln w="12700">
+              <a:tailEnd type="triangle"/>
+            </a:ln>
+          </p:spPr>
+          <p:style>
+            <a:lnRef idx="1">
+              <a:schemeClr val="accent1"/>
+            </a:lnRef>
+            <a:fillRef idx="0">
+              <a:schemeClr val="accent1"/>
+            </a:fillRef>
+            <a:effectRef idx="0">
+              <a:schemeClr val="accent1"/>
+            </a:effectRef>
+            <a:fontRef idx="minor">
+              <a:schemeClr val="tx1"/>
+            </a:fontRef>
+          </p:style>
+        </p:cxnSp>
+        <mc:AlternateContent xmlns:mc="http://schemas.openxmlformats.org/markup-compatibility/2006">
+          <mc:Choice xmlns:a14="http://schemas.microsoft.com/office/drawing/2010/main" Requires="a14">
+            <p:sp>
+              <p:nvSpPr>
+                <p:cNvPr id="48" name="TextBox 47"/>
+                <p:cNvSpPr txBox="1"/>
+                <p:nvPr/>
+              </p:nvSpPr>
+              <p:spPr>
+                <a:xfrm>
+                  <a:off x="1049060" y="483512"/>
+                  <a:ext cx="205486" cy="276999"/>
+                </a:xfrm>
+                <a:prstGeom prst="rect">
+                  <a:avLst/>
+                </a:prstGeom>
+                <a:noFill/>
+              </p:spPr>
+              <p:txBody>
+                <a:bodyPr wrap="square" rtlCol="0">
+                  <a:spAutoFit/>
+                </a:bodyPr>
+                <a:lstStyle/>
+                <a:p>
+                  <a:pPr/>
+                  <a14:m>
+                    <m:oMathPara xmlns:m="http://schemas.openxmlformats.org/officeDocument/2006/math">
+                      <m:oMathParaPr>
+                        <m:jc m:val="centerGroup"/>
+                      </m:oMathParaPr>
+                      <m:oMath xmlns:m="http://schemas.openxmlformats.org/officeDocument/2006/math">
+                        <m:sSub>
+                          <m:sSubPr>
+                            <m:ctrlPr>
+                              <a:rPr lang="en-US" sz="1200" i="1" smtClean="0">
+                                <a:latin typeface="Cambria Math" panose="02040503050406030204" pitchFamily="18" charset="0"/>
+                              </a:rPr>
+                            </m:ctrlPr>
+                          </m:sSubPr>
+                          <m:e>
+                            <m:r>
+                              <a:rPr lang="en-US" sz="1200" b="0" i="1" smtClean="0">
+                                <a:latin typeface="Cambria Math" panose="02040503050406030204" pitchFamily="18" charset="0"/>
+                              </a:rPr>
+                              <m:t>𝑒</m:t>
+                            </m:r>
+                          </m:e>
+                          <m:sub>
+                            <m:r>
+                              <a:rPr lang="en-US" sz="1200" b="0" i="1" smtClean="0">
+                                <a:latin typeface="Cambria Math" panose="02040503050406030204" pitchFamily="18" charset="0"/>
+                              </a:rPr>
+                              <m:t>𝑥</m:t>
+                            </m:r>
+                          </m:sub>
+                        </m:sSub>
+                      </m:oMath>
+                    </m:oMathPara>
+                  </a14:m>
+                  <a:endParaRPr lang="en-US" sz="1200" dirty="0">
+                    <a:solidFill>
+                      <a:schemeClr val="tx1"/>
+                    </a:solidFill>
+                    <a:latin typeface="cmbx12" panose="020B0500000000000000" pitchFamily="34" charset="0"/>
+                  </a:endParaRPr>
+                </a:p>
+              </p:txBody>
+            </p:sp>
+          </mc:Choice>
+          <mc:Fallback>
+            <p:sp>
+              <p:nvSpPr>
+                <p:cNvPr id="48" name="TextBox 47"/>
+                <p:cNvSpPr txBox="1">
+                  <a:spLocks noRot="1" noChangeAspect="1" noMove="1" noResize="1" noEditPoints="1" noAdjustHandles="1" noChangeArrowheads="1" noChangeShapeType="1" noTextEdit="1"/>
+                </p:cNvSpPr>
+                <p:nvPr/>
+              </p:nvSpPr>
+              <p:spPr>
+                <a:xfrm>
+                  <a:off x="1049060" y="483512"/>
+                  <a:ext cx="205486" cy="276999"/>
+                </a:xfrm>
+                <a:prstGeom prst="rect">
+                  <a:avLst/>
+                </a:prstGeom>
+                <a:blipFill rotWithShape="0">
+                  <a:blip r:embed="rId7"/>
+                  <a:stretch>
+                    <a:fillRect r="-23529"/>
+                  </a:stretch>
+                </a:blipFill>
+              </p:spPr>
+              <p:txBody>
+                <a:bodyPr/>
+                <a:lstStyle/>
+                <a:p>
+                  <a:r>
+                    <a:rPr lang="en-US">
+                      <a:noFill/>
+                    </a:rPr>
+                    <a:t> </a:t>
+                  </a:r>
+                </a:p>
+              </p:txBody>
+            </p:sp>
+          </mc:Fallback>
+        </mc:AlternateContent>
+        <mc:AlternateContent xmlns:mc="http://schemas.openxmlformats.org/markup-compatibility/2006">
+          <mc:Choice xmlns:a14="http://schemas.microsoft.com/office/drawing/2010/main" Requires="a14">
+            <p:sp>
+              <p:nvSpPr>
+                <p:cNvPr id="49" name="TextBox 48"/>
+                <p:cNvSpPr txBox="1"/>
+                <p:nvPr/>
+              </p:nvSpPr>
+              <p:spPr>
+                <a:xfrm>
+                  <a:off x="972654" y="221559"/>
+                  <a:ext cx="205486" cy="276999"/>
+                </a:xfrm>
+                <a:prstGeom prst="rect">
+                  <a:avLst/>
+                </a:prstGeom>
+                <a:noFill/>
+              </p:spPr>
+              <p:txBody>
+                <a:bodyPr wrap="square" rtlCol="0">
+                  <a:spAutoFit/>
+                </a:bodyPr>
+                <a:lstStyle/>
+                <a:p>
+                  <a:pPr/>
+                  <a14:m>
+                    <m:oMathPara xmlns:m="http://schemas.openxmlformats.org/officeDocument/2006/math">
+                      <m:oMathParaPr>
+                        <m:jc m:val="centerGroup"/>
+                      </m:oMathParaPr>
+                      <m:oMath xmlns:m="http://schemas.openxmlformats.org/officeDocument/2006/math">
+                        <m:sSub>
+                          <m:sSubPr>
+                            <m:ctrlPr>
+                              <a:rPr lang="en-US" sz="1200" i="1" smtClean="0">
+                                <a:latin typeface="Cambria Math" panose="02040503050406030204" pitchFamily="18" charset="0"/>
+                              </a:rPr>
+                            </m:ctrlPr>
+                          </m:sSubPr>
+                          <m:e>
+                            <m:r>
+                              <a:rPr lang="en-US" sz="1200" b="0" i="1" smtClean="0">
+                                <a:latin typeface="Cambria Math" panose="02040503050406030204" pitchFamily="18" charset="0"/>
+                              </a:rPr>
+                              <m:t>𝑒</m:t>
+                            </m:r>
+                          </m:e>
+                          <m:sub>
+                            <m:r>
+                              <a:rPr lang="en-US" sz="1200" b="0" i="1" smtClean="0">
+                                <a:latin typeface="Cambria Math" panose="02040503050406030204" pitchFamily="18" charset="0"/>
+                              </a:rPr>
+                              <m:t>𝑧</m:t>
+                            </m:r>
+                          </m:sub>
+                        </m:sSub>
+                      </m:oMath>
+                    </m:oMathPara>
+                  </a14:m>
+                  <a:endParaRPr lang="en-US" sz="1200" dirty="0">
+                    <a:solidFill>
+                      <a:schemeClr val="tx1"/>
+                    </a:solidFill>
+                    <a:latin typeface="cmbx12" panose="020B0500000000000000" pitchFamily="34" charset="0"/>
+                  </a:endParaRPr>
+                </a:p>
+              </p:txBody>
+            </p:sp>
+          </mc:Choice>
+          <mc:Fallback>
+            <p:sp>
+              <p:nvSpPr>
+                <p:cNvPr id="49" name="TextBox 48"/>
+                <p:cNvSpPr txBox="1">
+                  <a:spLocks noRot="1" noChangeAspect="1" noMove="1" noResize="1" noEditPoints="1" noAdjustHandles="1" noChangeArrowheads="1" noChangeShapeType="1" noTextEdit="1"/>
+                </p:cNvSpPr>
+                <p:nvPr/>
+              </p:nvSpPr>
+              <p:spPr>
+                <a:xfrm>
+                  <a:off x="972654" y="221559"/>
+                  <a:ext cx="205486" cy="276999"/>
+                </a:xfrm>
+                <a:prstGeom prst="rect">
+                  <a:avLst/>
+                </a:prstGeom>
+                <a:blipFill rotWithShape="0">
+                  <a:blip r:embed="rId8"/>
+                  <a:stretch>
+                    <a:fillRect r="-24242"/>
+                  </a:stretch>
+                </a:blipFill>
+              </p:spPr>
+              <p:txBody>
+                <a:bodyPr/>
+                <a:lstStyle/>
+                <a:p>
+                  <a:r>
+                    <a:rPr lang="en-US">
+                      <a:noFill/>
+                    </a:rPr>
+                    <a:t> </a:t>
+                  </a:r>
+                </a:p>
+              </p:txBody>
+            </p:sp>
+          </mc:Fallback>
+        </mc:AlternateContent>
+        <p:cxnSp>
+          <p:nvCxnSpPr>
+            <p:cNvPr id="60" name="Straight Arrow Connector 59"/>
+            <p:cNvCxnSpPr/>
+            <p:nvPr/>
+          </p:nvCxnSpPr>
+          <p:spPr>
+            <a:xfrm>
+              <a:off x="899210" y="539455"/>
+              <a:ext cx="0" cy="411480"/>
+            </a:xfrm>
+            <a:prstGeom prst="straightConnector1">
+              <a:avLst/>
+            </a:prstGeom>
+            <a:ln w="12700">
+              <a:tailEnd type="triangle"/>
+            </a:ln>
+          </p:spPr>
+          <p:style>
+            <a:lnRef idx="1">
+              <a:schemeClr val="accent1"/>
+            </a:lnRef>
+            <a:fillRef idx="0">
+              <a:schemeClr val="accent1"/>
+            </a:fillRef>
+            <a:effectRef idx="0">
+              <a:schemeClr val="accent1"/>
+            </a:effectRef>
+            <a:fontRef idx="minor">
+              <a:schemeClr val="tx1"/>
+            </a:fontRef>
+          </p:style>
+        </p:cxnSp>
+        <p:cxnSp>
+          <p:nvCxnSpPr>
+            <p:cNvPr id="61" name="Straight Arrow Connector 60"/>
+            <p:cNvCxnSpPr/>
+            <p:nvPr/>
+          </p:nvCxnSpPr>
+          <p:spPr>
+            <a:xfrm rot="4440000" flipV="1">
+              <a:off x="1096812" y="278629"/>
+              <a:ext cx="0" cy="411480"/>
+            </a:xfrm>
+            <a:prstGeom prst="straightConnector1">
+              <a:avLst/>
+            </a:prstGeom>
+            <a:ln w="12700">
+              <a:tailEnd type="triangle"/>
+            </a:ln>
+          </p:spPr>
+          <p:style>
+            <a:lnRef idx="1">
+              <a:schemeClr val="accent1"/>
+            </a:lnRef>
+            <a:fillRef idx="0">
+              <a:schemeClr val="accent1"/>
+            </a:fillRef>
+            <a:effectRef idx="0">
+              <a:schemeClr val="accent1"/>
+            </a:effectRef>
+            <a:fontRef idx="minor">
+              <a:schemeClr val="tx1"/>
+            </a:fontRef>
+          </p:style>
+        </p:cxnSp>
+        <mc:AlternateContent xmlns:mc="http://schemas.openxmlformats.org/markup-compatibility/2006">
+          <mc:Choice xmlns:a14="http://schemas.microsoft.com/office/drawing/2010/main" Requires="a14">
+            <p:sp>
+              <p:nvSpPr>
+                <p:cNvPr id="62" name="TextBox 61"/>
+                <p:cNvSpPr txBox="1"/>
+                <p:nvPr/>
+              </p:nvSpPr>
+              <p:spPr>
+                <a:xfrm>
+                  <a:off x="836142" y="675252"/>
+                  <a:ext cx="205486" cy="291618"/>
+                </a:xfrm>
+                <a:prstGeom prst="rect">
+                  <a:avLst/>
+                </a:prstGeom>
+                <a:noFill/>
+              </p:spPr>
+              <p:txBody>
+                <a:bodyPr wrap="square" rtlCol="0">
+                  <a:spAutoFit/>
+                </a:bodyPr>
+                <a:lstStyle/>
+                <a:p>
+                  <a:pPr/>
+                  <a14:m>
+                    <m:oMathPara xmlns:m="http://schemas.openxmlformats.org/officeDocument/2006/math">
+                      <m:oMathParaPr>
+                        <m:jc m:val="centerGroup"/>
+                      </m:oMathParaPr>
+                      <m:oMath xmlns:m="http://schemas.openxmlformats.org/officeDocument/2006/math">
+                        <m:sSub>
+                          <m:sSubPr>
+                            <m:ctrlPr>
+                              <a:rPr lang="en-US" sz="1200" i="1" smtClean="0">
+                                <a:latin typeface="Cambria Math" panose="02040503050406030204" pitchFamily="18" charset="0"/>
+                              </a:rPr>
+                            </m:ctrlPr>
+                          </m:sSubPr>
+                          <m:e>
+                            <m:r>
+                              <a:rPr lang="en-US" sz="1200" b="0" i="1" smtClean="0">
+                                <a:latin typeface="Cambria Math" panose="02040503050406030204" pitchFamily="18" charset="0"/>
+                              </a:rPr>
+                              <m:t>𝑒</m:t>
+                            </m:r>
+                          </m:e>
+                          <m:sub>
+                            <m:r>
+                              <a:rPr lang="en-US" sz="1200" b="0" i="1" smtClean="0">
+                                <a:latin typeface="Cambria Math" panose="02040503050406030204" pitchFamily="18" charset="0"/>
+                              </a:rPr>
+                              <m:t>𝑦</m:t>
+                            </m:r>
+                          </m:sub>
+                        </m:sSub>
+                      </m:oMath>
+                    </m:oMathPara>
+                  </a14:m>
+                  <a:endParaRPr lang="en-US" sz="1200" dirty="0">
+                    <a:solidFill>
+                      <a:schemeClr val="tx1"/>
+                    </a:solidFill>
+                    <a:latin typeface="cmbx12" panose="020B0500000000000000" pitchFamily="34" charset="0"/>
+                  </a:endParaRPr>
+                </a:p>
+              </p:txBody>
+            </p:sp>
+          </mc:Choice>
+          <mc:Fallback>
+            <p:sp>
+              <p:nvSpPr>
+                <p:cNvPr id="62" name="TextBox 61"/>
+                <p:cNvSpPr txBox="1">
+                  <a:spLocks noRot="1" noChangeAspect="1" noMove="1" noResize="1" noEditPoints="1" noAdjustHandles="1" noChangeArrowheads="1" noChangeShapeType="1" noTextEdit="1"/>
+                </p:cNvSpPr>
+                <p:nvPr/>
+              </p:nvSpPr>
+              <p:spPr>
+                <a:xfrm>
+                  <a:off x="836142" y="675252"/>
+                  <a:ext cx="205486" cy="291618"/>
+                </a:xfrm>
+                <a:prstGeom prst="rect">
+                  <a:avLst/>
+                </a:prstGeom>
+                <a:blipFill rotWithShape="0">
+                  <a:blip r:embed="rId9"/>
+                  <a:stretch>
+                    <a:fillRect r="-29412"/>
+                  </a:stretch>
+                </a:blipFill>
+              </p:spPr>
+              <p:txBody>
+                <a:bodyPr/>
+                <a:lstStyle/>
+                <a:p>
+                  <a:r>
+                    <a:rPr lang="en-US">
+                      <a:noFill/>
+                    </a:rPr>
+                    <a:t> </a:t>
+                  </a:r>
+                </a:p>
+              </p:txBody>
+            </p:sp>
+          </mc:Fallback>
+        </mc:AlternateContent>
+      </p:grpSp>
     </p:spTree>
     <p:extLst>
       <p:ext uri="{BB962C8B-B14F-4D97-AF65-F5344CB8AC3E}">
@@ -5271,7 +5796,7 @@
           <a:prstGeom prst="ellipse">
             <a:avLst/>
           </a:prstGeom>
-          <a:pattFill prst="pct10">
+          <a:pattFill prst="pct25">
             <a:fgClr>
               <a:schemeClr val="accent1"/>
             </a:fgClr>
@@ -6009,95 +6534,8 @@
           </a:fontRef>
         </p:style>
       </p:cxnSp>
-      <p:sp>
-        <p:nvSpPr>
-          <p:cNvPr id="24" name="Oval 23"/>
-          <p:cNvSpPr/>
-          <p:nvPr/>
-        </p:nvSpPr>
-        <p:spPr>
-          <a:xfrm>
-            <a:off x="6183191" y="5014935"/>
-            <a:ext cx="182880" cy="182880"/>
-          </a:xfrm>
-          <a:prstGeom prst="ellipse">
-            <a:avLst/>
-          </a:prstGeom>
-          <a:solidFill>
-            <a:schemeClr val="bg1"/>
-          </a:solidFill>
-        </p:spPr>
-        <p:style>
-          <a:lnRef idx="2">
-            <a:schemeClr val="accent1">
-              <a:shade val="50000"/>
-            </a:schemeClr>
-          </a:lnRef>
-          <a:fillRef idx="1">
-            <a:schemeClr val="accent1"/>
-          </a:fillRef>
-          <a:effectRef idx="0">
-            <a:schemeClr val="accent1"/>
-          </a:effectRef>
-          <a:fontRef idx="minor">
-            <a:schemeClr val="lt1"/>
-          </a:fontRef>
-        </p:style>
-        <p:txBody>
-          <a:bodyPr rtlCol="0" anchor="ctr"/>
-          <a:lstStyle/>
-          <a:p>
-            <a:pPr algn="ctr"/>
-            <a:endParaRPr lang="en-US"/>
-          </a:p>
-        </p:txBody>
-      </p:sp>
-      <p:sp>
-        <p:nvSpPr>
-          <p:cNvPr id="25" name="Flowchart: Summing Junction 24"/>
-          <p:cNvSpPr/>
-          <p:nvPr/>
-        </p:nvSpPr>
-        <p:spPr>
-          <a:xfrm>
-            <a:off x="4740040" y="5704942"/>
-            <a:ext cx="137160" cy="137160"/>
-          </a:xfrm>
-          <a:prstGeom prst="flowChartSummingJunction">
-            <a:avLst/>
-          </a:prstGeom>
-          <a:solidFill>
-            <a:schemeClr val="bg1"/>
-          </a:solidFill>
-          <a:ln w="12700"/>
-        </p:spPr>
-        <p:style>
-          <a:lnRef idx="2">
-            <a:schemeClr val="accent1">
-              <a:shade val="50000"/>
-            </a:schemeClr>
-          </a:lnRef>
-          <a:fillRef idx="1">
-            <a:schemeClr val="accent1"/>
-          </a:fillRef>
-          <a:effectRef idx="0">
-            <a:schemeClr val="accent1"/>
-          </a:effectRef>
-          <a:fontRef idx="minor">
-            <a:schemeClr val="lt1"/>
-          </a:fontRef>
-        </p:style>
-        <p:txBody>
-          <a:bodyPr rtlCol="0" anchor="ctr"/>
-          <a:lstStyle/>
-          <a:p>
-            <a:pPr algn="ctr"/>
-            <a:endParaRPr lang="en-US"/>
-          </a:p>
-        </p:txBody>
-      </p:sp>
-      <mc:AlternateContent xmlns:mc="http://schemas.openxmlformats.org/markup-compatibility/2006" xmlns:a14="http://schemas.microsoft.com/office/drawing/2010/main">
-        <mc:Choice Requires="a14">
+      <mc:AlternateContent xmlns:mc="http://schemas.openxmlformats.org/markup-compatibility/2006">
+        <mc:Choice xmlns:a14="http://schemas.microsoft.com/office/drawing/2010/main" Requires="a14">
           <p:sp>
             <p:nvSpPr>
               <p:cNvPr id="26" name="TextBox 25"/>
@@ -6107,7 +6545,7 @@
             <p:spPr>
               <a:xfrm>
                 <a:off x="4529996" y="5314593"/>
-                <a:ext cx="205486" cy="286447"/>
+                <a:ext cx="205486" cy="291618"/>
               </a:xfrm>
               <a:prstGeom prst="rect">
                 <a:avLst/>
@@ -6148,7 +6586,7 @@
                             <a:rPr lang="en-US" sz="1200" b="0" i="1" smtClean="0">
                               <a:latin typeface="Cambria Math" panose="02040503050406030204" pitchFamily="18" charset="0"/>
                             </a:rPr>
-                            <m:t>𝑧</m:t>
+                            <m:t>𝑦</m:t>
                           </m:r>
                         </m:sub>
                       </m:sSub>
@@ -6165,7 +6603,7 @@
             </p:txBody>
           </p:sp>
         </mc:Choice>
-        <mc:Fallback xmlns="">
+        <mc:Fallback>
           <p:sp>
             <p:nvSpPr>
               <p:cNvPr id="26" name="TextBox 25"/>
@@ -6177,7 +6615,7 @@
             <p:spPr>
               <a:xfrm>
                 <a:off x="4529996" y="5314593"/>
-                <a:ext cx="205486" cy="286447"/>
+                <a:ext cx="205486" cy="291618"/>
               </a:xfrm>
               <a:prstGeom prst="rect">
                 <a:avLst/>
@@ -6185,7 +6623,7 @@
               <a:blipFill rotWithShape="0">
                 <a:blip r:embed="rId2"/>
                 <a:stretch>
-                  <a:fillRect r="-20588"/>
+                  <a:fillRect r="-29412"/>
                 </a:stretch>
               </a:blipFill>
             </p:spPr>
@@ -6312,8 +6750,8 @@
           </p:sp>
         </mc:Fallback>
       </mc:AlternateContent>
-      <mc:AlternateContent xmlns:mc="http://schemas.openxmlformats.org/markup-compatibility/2006" xmlns:a14="http://schemas.microsoft.com/office/drawing/2010/main">
-        <mc:Choice Requires="a14">
+      <mc:AlternateContent xmlns:mc="http://schemas.openxmlformats.org/markup-compatibility/2006">
+        <mc:Choice xmlns:a14="http://schemas.microsoft.com/office/drawing/2010/main" Requires="a14">
           <p:sp>
             <p:nvSpPr>
               <p:cNvPr id="28" name="TextBox 27"/>
@@ -6323,7 +6761,7 @@
             <p:spPr>
               <a:xfrm>
                 <a:off x="4545099" y="5722705"/>
-                <a:ext cx="205486" cy="291618"/>
+                <a:ext cx="205486" cy="276999"/>
               </a:xfrm>
               <a:prstGeom prst="rect">
                 <a:avLst/>
@@ -6364,7 +6802,7 @@
                             <a:rPr lang="en-US" sz="1200" b="0" i="1" smtClean="0">
                               <a:latin typeface="Cambria Math" panose="02040503050406030204" pitchFamily="18" charset="0"/>
                             </a:rPr>
-                            <m:t>𝑦</m:t>
+                            <m:t>𝑧</m:t>
                           </m:r>
                         </m:sub>
                       </m:sSub>
@@ -6381,7 +6819,7 @@
             </p:txBody>
           </p:sp>
         </mc:Choice>
-        <mc:Fallback xmlns="">
+        <mc:Fallback>
           <p:sp>
             <p:nvSpPr>
               <p:cNvPr id="28" name="TextBox 27"/>
@@ -6393,7 +6831,7 @@
             <p:spPr>
               <a:xfrm>
                 <a:off x="4545099" y="5722705"/>
-                <a:ext cx="205486" cy="291618"/>
+                <a:ext cx="205486" cy="276999"/>
               </a:xfrm>
               <a:prstGeom prst="rect">
                 <a:avLst/>
@@ -6401,7 +6839,7 @@
               <a:blipFill rotWithShape="0">
                 <a:blip r:embed="rId4"/>
                 <a:stretch>
-                  <a:fillRect r="-33333"/>
+                  <a:fillRect r="-24242"/>
                 </a:stretch>
               </a:blipFill>
             </p:spPr>
@@ -6420,50 +6858,6 @@
           </p:sp>
         </mc:Fallback>
       </mc:AlternateContent>
-      <p:sp>
-        <p:nvSpPr>
-          <p:cNvPr id="29" name="Flowchart: Summing Junction 28"/>
-          <p:cNvSpPr/>
-          <p:nvPr/>
-        </p:nvSpPr>
-        <p:spPr>
-          <a:xfrm>
-            <a:off x="1837575" y="5680639"/>
-            <a:ext cx="137160" cy="137160"/>
-          </a:xfrm>
-          <a:prstGeom prst="flowChartSummingJunction">
-            <a:avLst/>
-          </a:prstGeom>
-          <a:solidFill>
-            <a:schemeClr val="bg1"/>
-          </a:solidFill>
-          <a:ln w="12700"/>
-        </p:spPr>
-        <p:style>
-          <a:lnRef idx="2">
-            <a:schemeClr val="accent1">
-              <a:shade val="50000"/>
-            </a:schemeClr>
-          </a:lnRef>
-          <a:fillRef idx="1">
-            <a:schemeClr val="accent1"/>
-          </a:fillRef>
-          <a:effectRef idx="0">
-            <a:schemeClr val="accent1"/>
-          </a:effectRef>
-          <a:fontRef idx="minor">
-            <a:schemeClr val="lt1"/>
-          </a:fontRef>
-        </p:style>
-        <p:txBody>
-          <a:bodyPr rtlCol="0" anchor="ctr"/>
-          <a:lstStyle/>
-          <a:p>
-            <a:pPr algn="ctr"/>
-            <a:endParaRPr lang="en-US"/>
-          </a:p>
-        </p:txBody>
-      </p:sp>
       <mc:AlternateContent xmlns:mc="http://schemas.openxmlformats.org/markup-compatibility/2006" xmlns:a14="http://schemas.microsoft.com/office/drawing/2010/main">
         <mc:Choice Requires="a14">
           <p:sp>
@@ -6553,6 +6947,228 @@
           </p:sp>
         </mc:Fallback>
       </mc:AlternateContent>
+      <p:grpSp>
+        <p:nvGrpSpPr>
+          <p:cNvPr id="7" name="Group 6"/>
+          <p:cNvGrpSpPr/>
+          <p:nvPr/>
+        </p:nvGrpSpPr>
+        <p:grpSpPr>
+          <a:xfrm>
+            <a:off x="4740040" y="5704942"/>
+            <a:ext cx="137160" cy="137160"/>
+            <a:chOff x="4740040" y="5704942"/>
+            <a:chExt cx="137160" cy="137160"/>
+          </a:xfrm>
+        </p:grpSpPr>
+        <p:sp>
+          <p:nvSpPr>
+            <p:cNvPr id="25" name="Oval 24"/>
+            <p:cNvSpPr/>
+            <p:nvPr/>
+          </p:nvSpPr>
+          <p:spPr>
+            <a:xfrm>
+              <a:off x="4740040" y="5704942"/>
+              <a:ext cx="137160" cy="137160"/>
+            </a:xfrm>
+            <a:prstGeom prst="ellipse">
+              <a:avLst/>
+            </a:prstGeom>
+            <a:solidFill>
+              <a:schemeClr val="bg1"/>
+            </a:solidFill>
+            <a:ln w="12700"/>
+          </p:spPr>
+          <p:style>
+            <a:lnRef idx="2">
+              <a:schemeClr val="accent1">
+                <a:shade val="50000"/>
+              </a:schemeClr>
+            </a:lnRef>
+            <a:fillRef idx="1">
+              <a:schemeClr val="accent1"/>
+            </a:fillRef>
+            <a:effectRef idx="0">
+              <a:schemeClr val="accent1"/>
+            </a:effectRef>
+            <a:fontRef idx="minor">
+              <a:schemeClr val="lt1"/>
+            </a:fontRef>
+          </p:style>
+          <p:txBody>
+            <a:bodyPr rtlCol="0" anchor="ctr"/>
+            <a:lstStyle/>
+            <a:p>
+              <a:pPr algn="ctr"/>
+              <a:endParaRPr lang="en-US"/>
+            </a:p>
+          </p:txBody>
+        </p:sp>
+        <p:sp>
+          <p:nvSpPr>
+            <p:cNvPr id="23" name="Oval 22"/>
+            <p:cNvSpPr/>
+            <p:nvPr/>
+          </p:nvSpPr>
+          <p:spPr>
+            <a:xfrm>
+              <a:off x="4785760" y="5750663"/>
+              <a:ext cx="45720" cy="45719"/>
+            </a:xfrm>
+            <a:prstGeom prst="ellipse">
+              <a:avLst/>
+            </a:prstGeom>
+            <a:solidFill>
+              <a:schemeClr val="accent1">
+                <a:lumMod val="75000"/>
+              </a:schemeClr>
+            </a:solidFill>
+            <a:ln w="12700">
+              <a:solidFill>
+                <a:schemeClr val="accent1">
+                  <a:lumMod val="75000"/>
+                </a:schemeClr>
+              </a:solidFill>
+            </a:ln>
+          </p:spPr>
+          <p:style>
+            <a:lnRef idx="2">
+              <a:schemeClr val="accent1">
+                <a:shade val="50000"/>
+              </a:schemeClr>
+            </a:lnRef>
+            <a:fillRef idx="1">
+              <a:schemeClr val="accent1"/>
+            </a:fillRef>
+            <a:effectRef idx="0">
+              <a:schemeClr val="accent1"/>
+            </a:effectRef>
+            <a:fontRef idx="minor">
+              <a:schemeClr val="lt1"/>
+            </a:fontRef>
+          </p:style>
+          <p:txBody>
+            <a:bodyPr rtlCol="0" anchor="ctr"/>
+            <a:lstStyle/>
+            <a:p>
+              <a:pPr algn="ctr"/>
+              <a:endParaRPr lang="en-US" dirty="0"/>
+            </a:p>
+          </p:txBody>
+        </p:sp>
+      </p:grpSp>
+      <p:grpSp>
+        <p:nvGrpSpPr>
+          <p:cNvPr id="35" name="Group 34"/>
+          <p:cNvGrpSpPr/>
+          <p:nvPr/>
+        </p:nvGrpSpPr>
+        <p:grpSpPr>
+          <a:xfrm>
+            <a:off x="1852678" y="5703056"/>
+            <a:ext cx="137160" cy="137160"/>
+            <a:chOff x="4740040" y="5704942"/>
+            <a:chExt cx="137160" cy="137160"/>
+          </a:xfrm>
+        </p:grpSpPr>
+        <p:sp>
+          <p:nvSpPr>
+            <p:cNvPr id="36" name="Oval 35"/>
+            <p:cNvSpPr/>
+            <p:nvPr/>
+          </p:nvSpPr>
+          <p:spPr>
+            <a:xfrm>
+              <a:off x="4740040" y="5704942"/>
+              <a:ext cx="137160" cy="137160"/>
+            </a:xfrm>
+            <a:prstGeom prst="ellipse">
+              <a:avLst/>
+            </a:prstGeom>
+            <a:solidFill>
+              <a:schemeClr val="bg1"/>
+            </a:solidFill>
+            <a:ln w="12700"/>
+          </p:spPr>
+          <p:style>
+            <a:lnRef idx="2">
+              <a:schemeClr val="accent1">
+                <a:shade val="50000"/>
+              </a:schemeClr>
+            </a:lnRef>
+            <a:fillRef idx="1">
+              <a:schemeClr val="accent1"/>
+            </a:fillRef>
+            <a:effectRef idx="0">
+              <a:schemeClr val="accent1"/>
+            </a:effectRef>
+            <a:fontRef idx="minor">
+              <a:schemeClr val="lt1"/>
+            </a:fontRef>
+          </p:style>
+          <p:txBody>
+            <a:bodyPr rtlCol="0" anchor="ctr"/>
+            <a:lstStyle/>
+            <a:p>
+              <a:pPr algn="ctr"/>
+              <a:endParaRPr lang="en-US"/>
+            </a:p>
+          </p:txBody>
+        </p:sp>
+        <p:sp>
+          <p:nvSpPr>
+            <p:cNvPr id="37" name="Oval 36"/>
+            <p:cNvSpPr/>
+            <p:nvPr/>
+          </p:nvSpPr>
+          <p:spPr>
+            <a:xfrm>
+              <a:off x="4785760" y="5750663"/>
+              <a:ext cx="45720" cy="45719"/>
+            </a:xfrm>
+            <a:prstGeom prst="ellipse">
+              <a:avLst/>
+            </a:prstGeom>
+            <a:solidFill>
+              <a:schemeClr val="accent1">
+                <a:lumMod val="75000"/>
+              </a:schemeClr>
+            </a:solidFill>
+            <a:ln w="12700">
+              <a:solidFill>
+                <a:schemeClr val="accent1">
+                  <a:lumMod val="75000"/>
+                </a:schemeClr>
+              </a:solidFill>
+            </a:ln>
+          </p:spPr>
+          <p:style>
+            <a:lnRef idx="2">
+              <a:schemeClr val="accent1">
+                <a:shade val="50000"/>
+              </a:schemeClr>
+            </a:lnRef>
+            <a:fillRef idx="1">
+              <a:schemeClr val="accent1"/>
+            </a:fillRef>
+            <a:effectRef idx="0">
+              <a:schemeClr val="accent1"/>
+            </a:effectRef>
+            <a:fontRef idx="minor">
+              <a:schemeClr val="lt1"/>
+            </a:fontRef>
+          </p:style>
+          <p:txBody>
+            <a:bodyPr rtlCol="0" anchor="ctr"/>
+            <a:lstStyle/>
+            <a:p>
+              <a:pPr algn="ctr"/>
+              <a:endParaRPr lang="en-US" dirty="0"/>
+            </a:p>
+          </p:txBody>
+        </p:sp>
+      </p:grpSp>
     </p:spTree>
     <p:extLst>
       <p:ext uri="{BB962C8B-B14F-4D97-AF65-F5344CB8AC3E}">

</xml_diff>